<commit_message>
Improved exercises after test run
</commit_message>
<xml_diff>
--- a/instructors/07-files-organization_BT.pptx
+++ b/instructors/07-files-organization_BT.pptx
@@ -5,32 +5,33 @@
     <p:sldMasterId id="2147483648" r:id="rId1"/>
   </p:sldMasterIdLst>
   <p:notesMasterIdLst>
-    <p:notesMasterId r:id="rId25"/>
+    <p:notesMasterId r:id="rId26"/>
   </p:notesMasterIdLst>
   <p:sldIdLst>
     <p:sldId id="280" r:id="rId2"/>
     <p:sldId id="256" r:id="rId3"/>
     <p:sldId id="259" r:id="rId4"/>
     <p:sldId id="279" r:id="rId5"/>
-    <p:sldId id="274" r:id="rId6"/>
-    <p:sldId id="281" r:id="rId7"/>
-    <p:sldId id="283" r:id="rId8"/>
-    <p:sldId id="271" r:id="rId9"/>
-    <p:sldId id="284" r:id="rId10"/>
-    <p:sldId id="277" r:id="rId11"/>
-    <p:sldId id="285" r:id="rId12"/>
-    <p:sldId id="273" r:id="rId13"/>
-    <p:sldId id="287" r:id="rId14"/>
-    <p:sldId id="286" r:id="rId15"/>
-    <p:sldId id="288" r:id="rId16"/>
-    <p:sldId id="289" r:id="rId17"/>
-    <p:sldId id="278" r:id="rId18"/>
-    <p:sldId id="290" r:id="rId19"/>
-    <p:sldId id="262" r:id="rId20"/>
-    <p:sldId id="272" r:id="rId21"/>
-    <p:sldId id="291" r:id="rId22"/>
-    <p:sldId id="292" r:id="rId23"/>
+    <p:sldId id="293" r:id="rId6"/>
+    <p:sldId id="274" r:id="rId7"/>
+    <p:sldId id="281" r:id="rId8"/>
+    <p:sldId id="283" r:id="rId9"/>
+    <p:sldId id="271" r:id="rId10"/>
+    <p:sldId id="284" r:id="rId11"/>
+    <p:sldId id="277" r:id="rId12"/>
+    <p:sldId id="285" r:id="rId13"/>
+    <p:sldId id="273" r:id="rId14"/>
+    <p:sldId id="287" r:id="rId15"/>
+    <p:sldId id="286" r:id="rId16"/>
+    <p:sldId id="288" r:id="rId17"/>
+    <p:sldId id="289" r:id="rId18"/>
+    <p:sldId id="278" r:id="rId19"/>
+    <p:sldId id="290" r:id="rId20"/>
+    <p:sldId id="262" r:id="rId21"/>
+    <p:sldId id="272" r:id="rId22"/>
+    <p:sldId id="291" r:id="rId23"/>
     <p:sldId id="258" r:id="rId24"/>
+    <p:sldId id="292" r:id="rId25"/>
   </p:sldIdLst>
   <p:sldSz cx="12192000" cy="6858000"/>
   <p:notesSz cx="6858000" cy="9144000"/>
@@ -219,7 +220,7 @@
           <a:p>
             <a:fld id="{585C48AE-4A1E-9A43-835F-510354165F99}" type="datetimeFigureOut">
               <a:rPr lang="en-GB" smtClean="0"/>
-              <a:t>06/09/2021</a:t>
+              <a:t>29/09/2021</a:t>
             </a:fld>
             <a:endParaRPr lang="en-GB"/>
           </a:p>
@@ -785,7 +786,7 @@
           <a:p>
             <a:fld id="{5913FB77-D8DB-4AB9-8EA5-EE8C3B57A5E1}" type="datetimeFigureOut">
               <a:rPr lang="en-GB" smtClean="0"/>
-              <a:t>06/09/2021</a:t>
+              <a:t>29/09/2021</a:t>
             </a:fld>
             <a:endParaRPr lang="en-GB"/>
           </a:p>
@@ -985,7 +986,7 @@
           <a:p>
             <a:fld id="{5913FB77-D8DB-4AB9-8EA5-EE8C3B57A5E1}" type="datetimeFigureOut">
               <a:rPr lang="en-GB" smtClean="0"/>
-              <a:t>06/09/2021</a:t>
+              <a:t>29/09/2021</a:t>
             </a:fld>
             <a:endParaRPr lang="en-GB"/>
           </a:p>
@@ -1195,7 +1196,7 @@
           <a:p>
             <a:fld id="{5913FB77-D8DB-4AB9-8EA5-EE8C3B57A5E1}" type="datetimeFigureOut">
               <a:rPr lang="en-GB" smtClean="0"/>
-              <a:t>06/09/2021</a:t>
+              <a:t>29/09/2021</a:t>
             </a:fld>
             <a:endParaRPr lang="en-GB"/>
           </a:p>
@@ -1395,7 +1396,7 @@
           <a:p>
             <a:fld id="{5913FB77-D8DB-4AB9-8EA5-EE8C3B57A5E1}" type="datetimeFigureOut">
               <a:rPr lang="en-GB" smtClean="0"/>
-              <a:t>06/09/2021</a:t>
+              <a:t>29/09/2021</a:t>
             </a:fld>
             <a:endParaRPr lang="en-GB"/>
           </a:p>
@@ -1671,7 +1672,7 @@
           <a:p>
             <a:fld id="{5913FB77-D8DB-4AB9-8EA5-EE8C3B57A5E1}" type="datetimeFigureOut">
               <a:rPr lang="en-GB" smtClean="0"/>
-              <a:t>06/09/2021</a:t>
+              <a:t>29/09/2021</a:t>
             </a:fld>
             <a:endParaRPr lang="en-GB"/>
           </a:p>
@@ -1939,7 +1940,7 @@
           <a:p>
             <a:fld id="{5913FB77-D8DB-4AB9-8EA5-EE8C3B57A5E1}" type="datetimeFigureOut">
               <a:rPr lang="en-GB" smtClean="0"/>
-              <a:t>06/09/2021</a:t>
+              <a:t>29/09/2021</a:t>
             </a:fld>
             <a:endParaRPr lang="en-GB"/>
           </a:p>
@@ -2354,7 +2355,7 @@
           <a:p>
             <a:fld id="{5913FB77-D8DB-4AB9-8EA5-EE8C3B57A5E1}" type="datetimeFigureOut">
               <a:rPr lang="en-GB" smtClean="0"/>
-              <a:t>06/09/2021</a:t>
+              <a:t>29/09/2021</a:t>
             </a:fld>
             <a:endParaRPr lang="en-GB"/>
           </a:p>
@@ -2496,7 +2497,7 @@
           <a:p>
             <a:fld id="{5913FB77-D8DB-4AB9-8EA5-EE8C3B57A5E1}" type="datetimeFigureOut">
               <a:rPr lang="en-GB" smtClean="0"/>
-              <a:t>06/09/2021</a:t>
+              <a:t>29/09/2021</a:t>
             </a:fld>
             <a:endParaRPr lang="en-GB"/>
           </a:p>
@@ -2609,7 +2610,7 @@
           <a:p>
             <a:fld id="{5913FB77-D8DB-4AB9-8EA5-EE8C3B57A5E1}" type="datetimeFigureOut">
               <a:rPr lang="en-GB" smtClean="0"/>
-              <a:t>06/09/2021</a:t>
+              <a:t>29/09/2021</a:t>
             </a:fld>
             <a:endParaRPr lang="en-GB"/>
           </a:p>
@@ -2922,7 +2923,7 @@
           <a:p>
             <a:fld id="{5913FB77-D8DB-4AB9-8EA5-EE8C3B57A5E1}" type="datetimeFigureOut">
               <a:rPr lang="en-GB" smtClean="0"/>
-              <a:t>06/09/2021</a:t>
+              <a:t>29/09/2021</a:t>
             </a:fld>
             <a:endParaRPr lang="en-GB"/>
           </a:p>
@@ -3211,7 +3212,7 @@
           <a:p>
             <a:fld id="{5913FB77-D8DB-4AB9-8EA5-EE8C3B57A5E1}" type="datetimeFigureOut">
               <a:rPr lang="en-GB" smtClean="0"/>
-              <a:t>06/09/2021</a:t>
+              <a:t>29/09/2021</a:t>
             </a:fld>
             <a:endParaRPr lang="en-GB"/>
           </a:p>
@@ -3454,7 +3455,7 @@
           <a:p>
             <a:fld id="{5913FB77-D8DB-4AB9-8EA5-EE8C3B57A5E1}" type="datetimeFigureOut">
               <a:rPr lang="en-GB" smtClean="0"/>
-              <a:t>06/09/2021</a:t>
+              <a:t>29/09/2021</a:t>
             </a:fld>
             <a:endParaRPr lang="en-GB"/>
           </a:p>
@@ -4098,7 +4099,7 @@
         <p:spPr>
           <a:xfrm>
             <a:off x="847780" y="1379400"/>
-            <a:ext cx="10600033" cy="3539430"/>
+            <a:ext cx="9751569" cy="3539430"/>
           </a:xfrm>
           <a:prstGeom prst="rect">
             <a:avLst/>
@@ -4118,7 +4119,7 @@
                   <a:srgbClr val="0070C0"/>
                 </a:solidFill>
               </a:rPr>
-              <a:t>Don'ts</a:t>
+              <a:t>Do’s</a:t>
             </a:r>
             <a:r>
               <a:rPr lang="en-GB" sz="2800" u="sng" dirty="0" smtClean="0">
@@ -4148,12 +4149,76 @@
               <a:buChar char="•"/>
             </a:pPr>
             <a:r>
+              <a:rPr lang="en-GB" sz="2800" dirty="0" smtClean="0">
+                <a:solidFill>
+                  <a:srgbClr val="0070C0"/>
+                </a:solidFill>
+              </a:rPr>
+              <a:t>Make </a:t>
+            </a:r>
+            <a:r>
               <a:rPr lang="en-GB" sz="2800" dirty="0">
                 <a:solidFill>
                   <a:srgbClr val="0070C0"/>
                 </a:solidFill>
               </a:rPr>
-              <a:t>Avoid using spaces (use _ or - instead</a:t>
+              <a:t>sure the </a:t>
+            </a:r>
+            <a:r>
+              <a:rPr lang="en-GB" sz="2800" dirty="0" smtClean="0">
+                <a:solidFill>
+                  <a:srgbClr val="0070C0"/>
+                </a:solidFill>
+              </a:rPr>
+              <a:t>file </a:t>
+            </a:r>
+            <a:r>
+              <a:rPr lang="en-GB" sz="2800" dirty="0">
+                <a:solidFill>
+                  <a:srgbClr val="0070C0"/>
+                </a:solidFill>
+              </a:rPr>
+              <a:t>format extension is present at the end of the name (e.g. .doc, .</a:t>
+            </a:r>
+            <a:r>
+              <a:rPr lang="en-GB" sz="2800" dirty="0" err="1" smtClean="0">
+                <a:solidFill>
+                  <a:srgbClr val="0070C0"/>
+                </a:solidFill>
+              </a:rPr>
+              <a:t>xls</a:t>
+            </a:r>
+            <a:r>
+              <a:rPr lang="pl-PL" sz="2800" dirty="0" smtClean="0">
+                <a:solidFill>
+                  <a:srgbClr val="0070C0"/>
+                </a:solidFill>
+              </a:rPr>
+              <a:t>x</a:t>
+            </a:r>
+            <a:r>
+              <a:rPr lang="en-GB" sz="2800" dirty="0" smtClean="0">
+                <a:solidFill>
+                  <a:srgbClr val="0070C0"/>
+                </a:solidFill>
+              </a:rPr>
+              <a:t>, </a:t>
+            </a:r>
+            <a:r>
+              <a:rPr lang="en-GB" sz="2800" dirty="0">
+                <a:solidFill>
+                  <a:srgbClr val="0070C0"/>
+                </a:solidFill>
+              </a:rPr>
+              <a:t>.mov, .</a:t>
+            </a:r>
+            <a:r>
+              <a:rPr lang="en-GB" sz="2800" dirty="0" err="1">
+                <a:solidFill>
+                  <a:srgbClr val="0070C0"/>
+                </a:solidFill>
+              </a:rPr>
+              <a:t>tif</a:t>
             </a:r>
             <a:r>
               <a:rPr lang="en-GB" sz="2800" dirty="0" smtClean="0">
@@ -4191,141 +4256,8 @@
                   <a:srgbClr val="0070C0"/>
                 </a:solidFill>
               </a:rPr>
-              <a:t>Avoid using </a:t>
-            </a:r>
-            <a:r>
-              <a:rPr lang="en-GB" sz="2800" dirty="0" smtClean="0">
-                <a:solidFill>
-                  <a:srgbClr val="0070C0"/>
-                </a:solidFill>
-              </a:rPr>
-              <a:t>commas</a:t>
-            </a:r>
-            <a:r>
-              <a:rPr lang="pl-PL" sz="2800" dirty="0" smtClean="0">
-                <a:solidFill>
-                  <a:srgbClr val="0070C0"/>
-                </a:solidFill>
-              </a:rPr>
-              <a:t> and</a:t>
-            </a:r>
-            <a:r>
-              <a:rPr lang="en-GB" sz="2800" dirty="0" smtClean="0">
-                <a:solidFill>
-                  <a:srgbClr val="0070C0"/>
-                </a:solidFill>
-              </a:rPr>
-              <a:t> </a:t>
-            </a:r>
-            <a:r>
-              <a:rPr lang="en-GB" sz="2800" dirty="0">
-                <a:solidFill>
-                  <a:srgbClr val="0070C0"/>
-                </a:solidFill>
-              </a:rPr>
-              <a:t>special characters </a:t>
-            </a:r>
-            <a:r>
-              <a:rPr lang="pl-PL" sz="2800" dirty="0" smtClean="0">
-                <a:solidFill>
-                  <a:srgbClr val="0070C0"/>
-                </a:solidFill>
-              </a:rPr>
-              <a:t/>
-            </a:r>
-            <a:br>
-              <a:rPr lang="pl-PL" sz="2800" dirty="0" smtClean="0">
-                <a:solidFill>
-                  <a:srgbClr val="0070C0"/>
-                </a:solidFill>
-              </a:rPr>
-            </a:br>
-            <a:r>
-              <a:rPr lang="en-GB" sz="2800" dirty="0" smtClean="0">
-                <a:solidFill>
-                  <a:srgbClr val="0070C0"/>
-                </a:solidFill>
-              </a:rPr>
-              <a:t>(</a:t>
-            </a:r>
-            <a:r>
-              <a:rPr lang="en-GB" sz="2800" dirty="0">
-                <a:solidFill>
-                  <a:srgbClr val="0070C0"/>
-                </a:solidFill>
-              </a:rPr>
-              <a:t>e.g. ~ ! @ # $ % &lt; &gt; ?[ ] { } ‘)</a:t>
-            </a:r>
-          </a:p>
-          <a:p>
-            <a:pPr marL="457200" indent="-457200">
-              <a:buFont typeface="Arial" panose="020B0604020202020204" pitchFamily="34" charset="0"/>
-              <a:buChar char="•"/>
-            </a:pPr>
-            <a:endParaRPr lang="pl-PL" sz="2800" dirty="0" smtClean="0">
-              <a:solidFill>
-                <a:srgbClr val="0070C0"/>
-              </a:solidFill>
-            </a:endParaRPr>
-          </a:p>
-          <a:p>
-            <a:pPr marL="457200" indent="-457200">
-              <a:buFont typeface="Arial" panose="020B0604020202020204" pitchFamily="34" charset="0"/>
-              <a:buChar char="•"/>
-            </a:pPr>
-            <a:r>
-              <a:rPr lang="en-GB" sz="2800" dirty="0" smtClean="0">
-                <a:solidFill>
-                  <a:srgbClr val="0070C0"/>
-                </a:solidFill>
-              </a:rPr>
-              <a:t>Avoid </a:t>
-            </a:r>
-            <a:r>
-              <a:rPr lang="en-GB" sz="2800" dirty="0">
-                <a:solidFill>
-                  <a:srgbClr val="0070C0"/>
-                </a:solidFill>
-              </a:rPr>
-              <a:t>using language specific characters (</a:t>
-            </a:r>
-            <a:r>
-              <a:rPr lang="en-GB" sz="2800" dirty="0" err="1">
-                <a:solidFill>
-                  <a:srgbClr val="0070C0"/>
-                </a:solidFill>
-              </a:rPr>
-              <a:t>e.g</a:t>
-            </a:r>
-            <a:r>
-              <a:rPr lang="en-GB" sz="2800" dirty="0">
-                <a:solidFill>
-                  <a:srgbClr val="0070C0"/>
-                </a:solidFill>
-              </a:rPr>
-              <a:t> </a:t>
-            </a:r>
-            <a:r>
-              <a:rPr lang="en-GB" sz="2800" dirty="0" err="1">
-                <a:solidFill>
-                  <a:srgbClr val="0070C0"/>
-                </a:solidFill>
-              </a:rPr>
-              <a:t>óężé</a:t>
-            </a:r>
-            <a:r>
-              <a:rPr lang="en-GB" sz="2800" dirty="0" smtClean="0">
-                <a:solidFill>
-                  <a:srgbClr val="0070C0"/>
-                </a:solidFill>
-              </a:rPr>
-              <a:t>)</a:t>
-            </a:r>
-            <a:endParaRPr lang="en-GB" sz="2800" dirty="0">
-              <a:solidFill>
-                <a:srgbClr val="0070C0"/>
-              </a:solidFill>
-            </a:endParaRPr>
+              <a:t>Add a PROJECT_STRUCTURE (README) file in your top directory which details your naming convention, directory structure and abbreviations</a:t>
+            </a:r>
           </a:p>
         </p:txBody>
       </p:sp>
@@ -4419,7 +4351,7 @@
     </p:spTree>
     <p:extLst>
       <p:ext uri="{BB962C8B-B14F-4D97-AF65-F5344CB8AC3E}">
-        <p14:creationId xmlns:p14="http://schemas.microsoft.com/office/powerpoint/2010/main" val="1659394794"/>
+        <p14:creationId xmlns:p14="http://schemas.microsoft.com/office/powerpoint/2010/main" val="3899321088"/>
       </p:ext>
     </p:extLst>
   </p:cSld>
@@ -4461,7 +4393,7 @@
         <p:spPr>
           <a:xfrm>
             <a:off x="847780" y="1379400"/>
-            <a:ext cx="10600033" cy="4401205"/>
+            <a:ext cx="10600033" cy="3539430"/>
           </a:xfrm>
           <a:prstGeom prst="rect">
             <a:avLst/>
@@ -4506,45 +4438,34 @@
             </a:endParaRPr>
           </a:p>
           <a:p>
-            <a:pPr marL="457200" indent="-457200" algn="just">
+            <a:pPr marL="457200" indent="-457200">
               <a:buFont typeface="Arial" panose="020B0604020202020204" pitchFamily="34" charset="0"/>
               <a:buChar char="•"/>
             </a:pPr>
             <a:r>
+              <a:rPr lang="en-GB" sz="2800" dirty="0">
+                <a:solidFill>
+                  <a:srgbClr val="0070C0"/>
+                </a:solidFill>
+              </a:rPr>
+              <a:t>Avoid using spaces (use _ or - instead</a:t>
+            </a:r>
+            <a:r>
               <a:rPr lang="en-GB" sz="2800" dirty="0" smtClean="0">
                 <a:solidFill>
                   <a:srgbClr val="0070C0"/>
                 </a:solidFill>
               </a:rPr>
-              <a:t>Avoid </a:t>
-            </a:r>
-            <a:r>
-              <a:rPr lang="en-GB" sz="2800" dirty="0">
-                <a:solidFill>
-                  <a:srgbClr val="0070C0"/>
-                </a:solidFill>
-              </a:rPr>
-              <a:t>using long </a:t>
-            </a:r>
-            <a:r>
-              <a:rPr lang="en-GB" sz="2800" dirty="0" smtClean="0">
-                <a:solidFill>
-                  <a:srgbClr val="0070C0"/>
-                </a:solidFill>
-              </a:rPr>
-              <a:t>names</a:t>
-            </a:r>
-            <a:r>
-              <a:rPr lang="pl-PL" sz="2800" dirty="0" smtClean="0">
-                <a:solidFill>
-                  <a:srgbClr val="0070C0"/>
-                </a:solidFill>
-              </a:rPr>
-              <a:t> (should not exceed 30 characters)</a:t>
-            </a:r>
-          </a:p>
-          <a:p>
-            <a:pPr marL="457200" indent="-457200" algn="just">
+              <a:t>)</a:t>
+            </a:r>
+            <a:endParaRPr lang="pl-PL" sz="2800" dirty="0" smtClean="0">
+              <a:solidFill>
+                <a:srgbClr val="0070C0"/>
+              </a:solidFill>
+            </a:endParaRPr>
+          </a:p>
+          <a:p>
+            <a:pPr marL="457200" indent="-457200">
               <a:buFont typeface="Arial" panose="020B0604020202020204" pitchFamily="34" charset="0"/>
               <a:buChar char="•"/>
             </a:pPr>
@@ -4565,7 +4486,15 @@
                   <a:srgbClr val="0070C0"/>
                 </a:solidFill>
               </a:rPr>
-              <a:t>Avoid repeating </a:t>
+              <a:t>Avoid using </a:t>
+            </a:r>
+            <a:r>
+              <a:rPr lang="en-GB" sz="2800" dirty="0" smtClean="0">
+                <a:solidFill>
+                  <a:srgbClr val="0070C0"/>
+                </a:solidFill>
+              </a:rPr>
+              <a:t>commas</a:t>
             </a:r>
             <a:r>
               <a:rPr lang="pl-PL" sz="2800" dirty="0" smtClean="0">
@@ -4573,7 +4502,7 @@
                   <a:srgbClr val="0070C0"/>
                 </a:solidFill>
               </a:rPr>
-              <a:t>information from parent </a:t>
+              <a:t> and</a:t>
             </a:r>
             <a:r>
               <a:rPr lang="en-GB" sz="2800" dirty="0" smtClean="0">
@@ -4581,10 +4510,18 @@
                   <a:srgbClr val="0070C0"/>
                 </a:solidFill>
               </a:rPr>
-              <a:t>elements</a:t>
-            </a:r>
-            <a:r>
-              <a:rPr lang="pl-PL" sz="2800" dirty="0">
+              <a:t> </a:t>
+            </a:r>
+            <a:r>
+              <a:rPr lang="en-GB" sz="2800" dirty="0">
+                <a:solidFill>
+                  <a:srgbClr val="0070C0"/>
+                </a:solidFill>
+              </a:rPr>
+              <a:t>special characters </a:t>
+            </a:r>
+            <a:r>
+              <a:rPr lang="pl-PL" sz="2800" dirty="0" smtClean="0">
                 <a:solidFill>
                   <a:srgbClr val="0070C0"/>
                 </a:solidFill>
@@ -4592,64 +4529,31 @@
               <a:t/>
             </a:r>
             <a:br>
-              <a:rPr lang="pl-PL" sz="2800" dirty="0">
+              <a:rPr lang="pl-PL" sz="2800" dirty="0" smtClean="0">
                 <a:solidFill>
                   <a:srgbClr val="0070C0"/>
                 </a:solidFill>
               </a:rPr>
             </a:br>
             <a:r>
-              <a:rPr lang="pl-PL" sz="2800" dirty="0" smtClean="0">
-                <a:solidFill>
-                  <a:srgbClr val="0070C0"/>
-                </a:solidFill>
-                <a:latin typeface="Courier New" panose="02070309020205020404" pitchFamily="49" charset="0"/>
-                <a:cs typeface="Courier New" panose="02070309020205020404" pitchFamily="49" charset="0"/>
-              </a:rPr>
-              <a:t>ELN_MI_20200101.tiff</a:t>
-            </a:r>
-            <a:r>
-              <a:rPr lang="pl-PL" sz="2800" dirty="0" smtClean="0">
-                <a:solidFill>
-                  <a:srgbClr val="0070C0"/>
-                </a:solidFill>
-              </a:rPr>
-              <a:t> </a:t>
-            </a:r>
-            <a:r>
-              <a:rPr lang="pl-PL" sz="2800" dirty="0">
-                <a:solidFill>
-                  <a:srgbClr val="0070C0"/>
-                </a:solidFill>
-              </a:rPr>
-              <a:t>in </a:t>
-            </a:r>
-            <a:r>
-              <a:rPr lang="pl-PL" sz="2800" dirty="0" smtClean="0">
-                <a:solidFill>
-                  <a:srgbClr val="0070C0"/>
-                </a:solidFill>
-                <a:latin typeface="Courier New" panose="02070309020205020404" pitchFamily="49" charset="0"/>
-                <a:cs typeface="Courier New" panose="02070309020205020404" pitchFamily="49" charset="0"/>
-              </a:rPr>
-              <a:t>Electron_Microscopy</a:t>
-            </a:r>
-            <a:r>
-              <a:rPr lang="pl-PL" sz="2800" dirty="0" smtClean="0">
-                <a:solidFill>
-                  <a:srgbClr val="0070C0"/>
-                </a:solidFill>
-              </a:rPr>
-              <a:t> folder</a:t>
-            </a:r>
-            <a:endParaRPr lang="en-GB" sz="2800" dirty="0">
-              <a:solidFill>
-                <a:srgbClr val="0070C0"/>
-              </a:solidFill>
-            </a:endParaRPr>
-          </a:p>
-          <a:p>
-            <a:pPr marL="457200" indent="-457200" algn="just">
+              <a:rPr lang="en-GB" sz="2800" dirty="0" smtClean="0">
+                <a:solidFill>
+                  <a:srgbClr val="0070C0"/>
+                </a:solidFill>
+              </a:rPr>
+              <a:t>(</a:t>
+            </a:r>
+            <a:r>
+              <a:rPr lang="en-GB" sz="2800" dirty="0">
+                <a:solidFill>
+                  <a:srgbClr val="0070C0"/>
+                </a:solidFill>
+              </a:rPr>
+              <a:t>e.g. ~ ! @ # $ % &lt; &gt; ?[ ] { } ‘)</a:t>
+            </a:r>
+          </a:p>
+          <a:p>
+            <a:pPr marL="457200" indent="-457200">
               <a:buFont typeface="Arial" panose="020B0604020202020204" pitchFamily="34" charset="0"/>
               <a:buChar char="•"/>
             </a:pPr>
@@ -4665,28 +4569,44 @@
               <a:buChar char="•"/>
             </a:pPr>
             <a:r>
-              <a:rPr lang="pl-PL" sz="2800" dirty="0" smtClean="0">
-                <a:solidFill>
-                  <a:srgbClr val="0070C0"/>
-                </a:solidFill>
-              </a:rPr>
-              <a:t>Avoid u</a:t>
-            </a:r>
-            <a:r>
               <a:rPr lang="en-GB" sz="2800" dirty="0" smtClean="0">
                 <a:solidFill>
                   <a:srgbClr val="0070C0"/>
                 </a:solidFill>
               </a:rPr>
-              <a:t>s</a:t>
-            </a:r>
-            <a:r>
-              <a:rPr lang="pl-PL" sz="2800" dirty="0" smtClean="0">
-                <a:solidFill>
-                  <a:srgbClr val="0070C0"/>
-                </a:solidFill>
-              </a:rPr>
-              <a:t>ing</a:t>
+              <a:t>Avoid </a:t>
+            </a:r>
+            <a:r>
+              <a:rPr lang="en-GB" sz="2800" dirty="0">
+                <a:solidFill>
+                  <a:srgbClr val="0070C0"/>
+                </a:solidFill>
+              </a:rPr>
+              <a:t>using language specific characters (</a:t>
+            </a:r>
+            <a:r>
+              <a:rPr lang="en-GB" sz="2800" dirty="0" err="1">
+                <a:solidFill>
+                  <a:srgbClr val="0070C0"/>
+                </a:solidFill>
+              </a:rPr>
+              <a:t>e.g</a:t>
+            </a:r>
+            <a:r>
+              <a:rPr lang="en-GB" sz="2800" dirty="0">
+                <a:solidFill>
+                  <a:srgbClr val="0070C0"/>
+                </a:solidFill>
+              </a:rPr>
+              <a:t> </a:t>
+            </a:r>
+            <a:r>
+              <a:rPr lang="en-GB" sz="2800" dirty="0" err="1">
+                <a:solidFill>
+                  <a:srgbClr val="0070C0"/>
+                </a:solidFill>
+              </a:rPr>
+              <a:t>óężé</a:t>
             </a:r>
             <a:r>
               <a:rPr lang="en-GB" sz="2800" dirty="0" smtClean="0">
@@ -4694,62 +4614,8 @@
                   <a:srgbClr val="0070C0"/>
                 </a:solidFill>
               </a:rPr>
-              <a:t> </a:t>
-            </a:r>
-            <a:r>
-              <a:rPr lang="en-GB" sz="2800" dirty="0">
-                <a:solidFill>
-                  <a:srgbClr val="0070C0"/>
-                </a:solidFill>
-              </a:rPr>
-              <a:t>deep paths with long names </a:t>
-            </a:r>
-            <a:r>
-              <a:rPr lang="pl-PL" sz="2800" dirty="0" smtClean="0">
-                <a:solidFill>
-                  <a:srgbClr val="0070C0"/>
-                </a:solidFill>
-              </a:rPr>
-              <a:t/>
-            </a:r>
-            <a:br>
-              <a:rPr lang="pl-PL" sz="2800" dirty="0" smtClean="0">
-                <a:solidFill>
-                  <a:srgbClr val="0070C0"/>
-                </a:solidFill>
-              </a:rPr>
-            </a:br>
-            <a:r>
-              <a:rPr lang="en-GB" sz="2800" dirty="0" smtClean="0">
-                <a:solidFill>
-                  <a:srgbClr val="0070C0"/>
-                </a:solidFill>
-              </a:rPr>
-              <a:t>(</a:t>
-            </a:r>
-            <a:r>
-              <a:rPr lang="en-GB" sz="2800" dirty="0">
-                <a:solidFill>
-                  <a:srgbClr val="0070C0"/>
-                </a:solidFill>
-              </a:rPr>
-              <a:t>i.e. deeply nested folders with long names) </a:t>
-            </a:r>
-            <a:r>
-              <a:rPr lang="pl-PL" sz="2800" dirty="0" smtClean="0">
-                <a:solidFill>
-                  <a:srgbClr val="0070C0"/>
-                </a:solidFill>
-              </a:rPr>
-              <a:t/>
-            </a:r>
-            <a:br>
-              <a:rPr lang="pl-PL" sz="2800" dirty="0" smtClean="0">
-                <a:solidFill>
-                  <a:srgbClr val="0070C0"/>
-                </a:solidFill>
-              </a:rPr>
-            </a:br>
+              <a:t>)</a:t>
+            </a:r>
             <a:endParaRPr lang="en-GB" sz="2800" dirty="0">
               <a:solidFill>
                 <a:srgbClr val="0070C0"/>
@@ -4848,7 +4714,7 @@
     </p:spTree>
     <p:extLst>
       <p:ext uri="{BB962C8B-B14F-4D97-AF65-F5344CB8AC3E}">
-        <p14:creationId xmlns:p14="http://schemas.microsoft.com/office/powerpoint/2010/main" val="267634741"/>
+        <p14:creationId xmlns:p14="http://schemas.microsoft.com/office/powerpoint/2010/main" val="1659394794"/>
       </p:ext>
     </p:extLst>
   </p:cSld>
@@ -4889,8 +4755,8 @@
         </p:nvSpPr>
         <p:spPr>
           <a:xfrm>
-            <a:off x="1363735" y="1129464"/>
-            <a:ext cx="9464530" cy="1384995"/>
+            <a:off x="847780" y="1379400"/>
+            <a:ext cx="10600033" cy="4401205"/>
           </a:xfrm>
           <a:prstGeom prst="rect">
             <a:avLst/>
@@ -4903,17 +4769,80 @@
           </a:bodyPr>
           <a:lstStyle/>
           <a:p>
+            <a:pPr algn="just"/>
+            <a:r>
+              <a:rPr lang="en-GB" sz="2800" u="sng" dirty="0">
+                <a:solidFill>
+                  <a:srgbClr val="0070C0"/>
+                </a:solidFill>
+              </a:rPr>
+              <a:t>Don'ts</a:t>
+            </a:r>
+            <a:r>
+              <a:rPr lang="en-GB" sz="2800" u="sng" dirty="0" smtClean="0">
+                <a:solidFill>
+                  <a:srgbClr val="0070C0"/>
+                </a:solidFill>
+              </a:rPr>
+              <a:t>:</a:t>
+            </a:r>
+            <a:endParaRPr lang="pl-PL" sz="2800" u="sng" dirty="0" smtClean="0">
+              <a:solidFill>
+                <a:srgbClr val="0070C0"/>
+              </a:solidFill>
+            </a:endParaRPr>
+          </a:p>
+          <a:p>
+            <a:pPr algn="just"/>
+            <a:endParaRPr lang="en-GB" sz="2800" u="sng" dirty="0">
+              <a:solidFill>
+                <a:srgbClr val="0070C0"/>
+              </a:solidFill>
+            </a:endParaRPr>
+          </a:p>
+          <a:p>
+            <a:pPr marL="457200" indent="-457200" algn="just">
+              <a:buFont typeface="Arial" panose="020B0604020202020204" pitchFamily="34" charset="0"/>
+              <a:buChar char="•"/>
+            </a:pPr>
+            <a:r>
+              <a:rPr lang="en-GB" sz="2800" dirty="0" smtClean="0">
+                <a:solidFill>
+                  <a:srgbClr val="0070C0"/>
+                </a:solidFill>
+              </a:rPr>
+              <a:t>Avoid </a:t>
+            </a:r>
             <a:r>
               <a:rPr lang="en-GB" sz="2800" dirty="0">
                 <a:solidFill>
                   <a:srgbClr val="0070C0"/>
                 </a:solidFill>
               </a:rPr>
-              <a:t>Exercise 2: </a:t>
-            </a:r>
-          </a:p>
-          <a:p>
-            <a:pPr algn="ctr"/>
+              <a:t>using long </a:t>
+            </a:r>
+            <a:r>
+              <a:rPr lang="en-GB" sz="2800" dirty="0" smtClean="0">
+                <a:solidFill>
+                  <a:srgbClr val="0070C0"/>
+                </a:solidFill>
+              </a:rPr>
+              <a:t>names</a:t>
+            </a:r>
+            <a:r>
+              <a:rPr lang="pl-PL" sz="2800" dirty="0" smtClean="0">
+                <a:solidFill>
+                  <a:srgbClr val="0070C0"/>
+                </a:solidFill>
+              </a:rPr>
+              <a:t> (should not exceed 30 characters)</a:t>
+            </a:r>
+          </a:p>
+          <a:p>
+            <a:pPr marL="457200" indent="-457200" algn="just">
+              <a:buFont typeface="Arial" panose="020B0604020202020204" pitchFamily="34" charset="0"/>
+              <a:buChar char="•"/>
+            </a:pPr>
             <a:endParaRPr lang="en-GB" sz="2800" dirty="0">
               <a:solidFill>
                 <a:srgbClr val="0070C0"/>
@@ -4921,14 +4850,92 @@
             </a:endParaRPr>
           </a:p>
           <a:p>
-            <a:pPr algn="ctr"/>
+            <a:pPr marL="457200" indent="-457200">
+              <a:buFont typeface="Arial" panose="020B0604020202020204" pitchFamily="34" charset="0"/>
+              <a:buChar char="•"/>
+            </a:pPr>
+            <a:r>
+              <a:rPr lang="en-GB" sz="2800" dirty="0">
+                <a:solidFill>
+                  <a:srgbClr val="0070C0"/>
+                </a:solidFill>
+              </a:rPr>
+              <a:t>Avoid repeating </a:t>
+            </a:r>
             <a:r>
               <a:rPr lang="pl-PL" sz="2800" dirty="0" smtClean="0">
                 <a:solidFill>
                   <a:srgbClr val="0070C0"/>
                 </a:solidFill>
               </a:rPr>
-              <a:t>A good name</a:t>
+              <a:t>information from parent </a:t>
+            </a:r>
+            <a:r>
+              <a:rPr lang="en-GB" sz="2800" dirty="0" smtClean="0">
+                <a:solidFill>
+                  <a:srgbClr val="0070C0"/>
+                </a:solidFill>
+              </a:rPr>
+              <a:t>elements</a:t>
+            </a:r>
+            <a:r>
+              <a:rPr lang="pl-PL" sz="2800" dirty="0">
+                <a:solidFill>
+                  <a:srgbClr val="0070C0"/>
+                </a:solidFill>
+              </a:rPr>
+              <a:t/>
+            </a:r>
+            <a:br>
+              <a:rPr lang="pl-PL" sz="2800" dirty="0">
+                <a:solidFill>
+                  <a:srgbClr val="0070C0"/>
+                </a:solidFill>
+              </a:rPr>
+            </a:br>
+            <a:r>
+              <a:rPr lang="pl-PL" sz="2800" dirty="0" smtClean="0">
+                <a:solidFill>
+                  <a:srgbClr val="0070C0"/>
+                </a:solidFill>
+                <a:latin typeface="Courier New" panose="02070309020205020404" pitchFamily="49" charset="0"/>
+                <a:cs typeface="Courier New" panose="02070309020205020404" pitchFamily="49" charset="0"/>
+              </a:rPr>
+              <a:t>ELN_MI_20200101.tiff</a:t>
+            </a:r>
+            <a:r>
+              <a:rPr lang="pl-PL" sz="2800" dirty="0" smtClean="0">
+                <a:solidFill>
+                  <a:srgbClr val="0070C0"/>
+                </a:solidFill>
+              </a:rPr>
+              <a:t> </a:t>
+            </a:r>
+            <a:r>
+              <a:rPr lang="pl-PL" sz="2800" dirty="0">
+                <a:solidFill>
+                  <a:srgbClr val="0070C0"/>
+                </a:solidFill>
+              </a:rPr>
+              <a:t>in </a:t>
+            </a:r>
+            <a:r>
+              <a:rPr lang="pl-PL" sz="2800" dirty="0" smtClean="0">
+                <a:solidFill>
+                  <a:srgbClr val="0070C0"/>
+                </a:solidFill>
+                <a:latin typeface="Courier New" panose="02070309020205020404" pitchFamily="49" charset="0"/>
+                <a:cs typeface="Courier New" panose="02070309020205020404" pitchFamily="49" charset="0"/>
+              </a:rPr>
+              <a:t>Electron_Microscopy</a:t>
+            </a:r>
+            <a:r>
+              <a:rPr lang="pl-PL" sz="2800" dirty="0" smtClean="0">
+                <a:solidFill>
+                  <a:srgbClr val="0070C0"/>
+                </a:solidFill>
+              </a:rPr>
+              <a:t> folder</a:t>
             </a:r>
             <a:endParaRPr lang="en-GB" sz="2800" dirty="0">
               <a:solidFill>
@@ -4936,14 +4943,122 @@
               </a:solidFill>
             </a:endParaRPr>
           </a:p>
+          <a:p>
+            <a:pPr marL="457200" indent="-457200" algn="just">
+              <a:buFont typeface="Arial" panose="020B0604020202020204" pitchFamily="34" charset="0"/>
+              <a:buChar char="•"/>
+            </a:pPr>
+            <a:endParaRPr lang="pl-PL" sz="2800" dirty="0" smtClean="0">
+              <a:solidFill>
+                <a:srgbClr val="0070C0"/>
+              </a:solidFill>
+            </a:endParaRPr>
+          </a:p>
+          <a:p>
+            <a:pPr marL="457200" indent="-457200">
+              <a:buFont typeface="Arial" panose="020B0604020202020204" pitchFamily="34" charset="0"/>
+              <a:buChar char="•"/>
+            </a:pPr>
+            <a:r>
+              <a:rPr lang="pl-PL" sz="2800" dirty="0" smtClean="0">
+                <a:solidFill>
+                  <a:srgbClr val="0070C0"/>
+                </a:solidFill>
+              </a:rPr>
+              <a:t>Avoid u</a:t>
+            </a:r>
+            <a:r>
+              <a:rPr lang="en-GB" sz="2800" dirty="0" smtClean="0">
+                <a:solidFill>
+                  <a:srgbClr val="0070C0"/>
+                </a:solidFill>
+              </a:rPr>
+              <a:t>s</a:t>
+            </a:r>
+            <a:r>
+              <a:rPr lang="pl-PL" sz="2800" dirty="0" smtClean="0">
+                <a:solidFill>
+                  <a:srgbClr val="0070C0"/>
+                </a:solidFill>
+              </a:rPr>
+              <a:t>ing</a:t>
+            </a:r>
+            <a:r>
+              <a:rPr lang="en-GB" sz="2800" dirty="0" smtClean="0">
+                <a:solidFill>
+                  <a:srgbClr val="0070C0"/>
+                </a:solidFill>
+              </a:rPr>
+              <a:t> </a:t>
+            </a:r>
+            <a:r>
+              <a:rPr lang="en-GB" sz="2800" dirty="0">
+                <a:solidFill>
+                  <a:srgbClr val="0070C0"/>
+                </a:solidFill>
+              </a:rPr>
+              <a:t>deep paths with long names </a:t>
+            </a:r>
+            <a:r>
+              <a:rPr lang="pl-PL" sz="2800" dirty="0" smtClean="0">
+                <a:solidFill>
+                  <a:srgbClr val="0070C0"/>
+                </a:solidFill>
+              </a:rPr>
+              <a:t/>
+            </a:r>
+            <a:br>
+              <a:rPr lang="pl-PL" sz="2800" dirty="0" smtClean="0">
+                <a:solidFill>
+                  <a:srgbClr val="0070C0"/>
+                </a:solidFill>
+              </a:rPr>
+            </a:br>
+            <a:r>
+              <a:rPr lang="en-GB" sz="2800" dirty="0" smtClean="0">
+                <a:solidFill>
+                  <a:srgbClr val="0070C0"/>
+                </a:solidFill>
+              </a:rPr>
+              <a:t>(</a:t>
+            </a:r>
+            <a:r>
+              <a:rPr lang="en-GB" sz="2800" dirty="0">
+                <a:solidFill>
+                  <a:srgbClr val="0070C0"/>
+                </a:solidFill>
+              </a:rPr>
+              <a:t>i.e. deeply nested folders with long names) </a:t>
+            </a:r>
+            <a:r>
+              <a:rPr lang="pl-PL" sz="2800" dirty="0" smtClean="0">
+                <a:solidFill>
+                  <a:srgbClr val="0070C0"/>
+                </a:solidFill>
+              </a:rPr>
+              <a:t/>
+            </a:r>
+            <a:br>
+              <a:rPr lang="pl-PL" sz="2800" dirty="0" smtClean="0">
+                <a:solidFill>
+                  <a:srgbClr val="0070C0"/>
+                </a:solidFill>
+              </a:rPr>
+            </a:br>
+            <a:endParaRPr lang="en-GB" sz="2800" dirty="0">
+              <a:solidFill>
+                <a:srgbClr val="0070C0"/>
+              </a:solidFill>
+            </a:endParaRPr>
+          </a:p>
         </p:txBody>
       </p:sp>
       <p:pic>
         <p:nvPicPr>
-          <p:cNvPr id="4" name="Picture 2" descr="Ed_DaSH">
-            <a:extLst>
-              <a:ext uri="{FF2B5EF4-FFF2-40B4-BE49-F238E27FC236}">
-                <a16:creationId xmlns:a16="http://schemas.microsoft.com/office/drawing/2014/main" id="{A783256F-E39E-4712-96B0-240BD611CFEB}"/>
+          <p:cNvPr id="6" name="Picture 2" descr="Ed_DaSH">
+            <a:extLst>
+              <a:ext uri="{FF2B5EF4-FFF2-40B4-BE49-F238E27FC236}">
+                <a16:creationId xmlns:a16="http://schemas.microsoft.com/office/drawing/2014/main" id="{6F3CF586-06D2-46C3-A4A3-130E31C4A16F}"/>
               </a:ext>
             </a:extLst>
           </p:cNvPr>
@@ -4985,10 +5100,50 @@
           </a:extLst>
         </p:spPr>
       </p:pic>
+      <p:sp>
+        <p:nvSpPr>
+          <p:cNvPr id="4" name="TextBox 3">
+            <a:extLst>
+              <a:ext uri="{FF2B5EF4-FFF2-40B4-BE49-F238E27FC236}">
+                <a16:creationId xmlns:a16="http://schemas.microsoft.com/office/drawing/2014/main" id="{F4B0FDD5-5348-354F-A378-7241F2AF057B}"/>
+              </a:ext>
+            </a:extLst>
+          </p:cNvPr>
+          <p:cNvSpPr txBox="1"/>
+          <p:nvPr/>
+        </p:nvSpPr>
+        <p:spPr>
+          <a:xfrm>
+            <a:off x="2003831" y="444110"/>
+            <a:ext cx="3023585" cy="769441"/>
+          </a:xfrm>
+          <a:prstGeom prst="rect">
+            <a:avLst/>
+          </a:prstGeom>
+          <a:noFill/>
+        </p:spPr>
+        <p:txBody>
+          <a:bodyPr wrap="none" rtlCol="0">
+            <a:spAutoFit/>
+          </a:bodyPr>
+          <a:lstStyle/>
+          <a:p>
+            <a:pPr algn="ctr"/>
+            <a:r>
+              <a:rPr lang="en-GB" sz="4400" dirty="0">
+                <a:solidFill>
+                  <a:srgbClr val="0070C0"/>
+                </a:solidFill>
+              </a:rPr>
+              <a:t>Naming files</a:t>
+            </a:r>
+          </a:p>
+        </p:txBody>
+      </p:sp>
     </p:spTree>
     <p:extLst>
       <p:ext uri="{BB962C8B-B14F-4D97-AF65-F5344CB8AC3E}">
-        <p14:creationId xmlns:p14="http://schemas.microsoft.com/office/powerpoint/2010/main" val="373317662"/>
+        <p14:creationId xmlns:p14="http://schemas.microsoft.com/office/powerpoint/2010/main" val="267634741"/>
       </p:ext>
     </p:extLst>
   </p:cSld>
@@ -5029,8 +5184,8 @@
         </p:nvSpPr>
         <p:spPr>
           <a:xfrm>
-            <a:off x="847780" y="1379400"/>
-            <a:ext cx="9751569" cy="2246769"/>
+            <a:off x="1363735" y="1129464"/>
+            <a:ext cx="9464530" cy="1384995"/>
           </a:xfrm>
           <a:prstGeom prst="rect">
             <a:avLst/>
@@ -5043,76 +5198,47 @@
           </a:bodyPr>
           <a:lstStyle/>
           <a:p>
-            <a:pPr algn="just"/>
-            <a:endParaRPr lang="en-GB" sz="2800" u="sng" dirty="0">
-              <a:solidFill>
-                <a:srgbClr val="0070C0"/>
-              </a:solidFill>
-            </a:endParaRPr>
-          </a:p>
-          <a:p>
-            <a:pPr marL="457200" indent="-457200">
-              <a:buFont typeface="Arial" panose="020B0604020202020204" pitchFamily="34" charset="0"/>
-              <a:buChar char="•"/>
-            </a:pPr>
-            <a:r>
-              <a:rPr lang="en-GB" sz="2800" dirty="0" smtClean="0">
-                <a:solidFill>
-                  <a:srgbClr val="0070C0"/>
-                </a:solidFill>
-              </a:rPr>
-              <a:t>Folders permit grouping relevant data together</a:t>
-            </a:r>
-          </a:p>
-          <a:p>
-            <a:pPr marL="457200" indent="-457200">
-              <a:buFont typeface="Arial" panose="020B0604020202020204" pitchFamily="34" charset="0"/>
-              <a:buChar char="•"/>
-            </a:pPr>
-            <a:endParaRPr lang="en-GB" sz="2800" dirty="0" smtClean="0">
-              <a:solidFill>
-                <a:srgbClr val="0070C0"/>
-              </a:solidFill>
-            </a:endParaRPr>
-          </a:p>
-          <a:p>
-            <a:pPr marL="457200" indent="-457200">
-              <a:buFont typeface="Arial" panose="020B0604020202020204" pitchFamily="34" charset="0"/>
-              <a:buChar char="•"/>
-            </a:pPr>
-            <a:r>
-              <a:rPr lang="pl-PL" sz="2800" dirty="0" smtClean="0">
-                <a:solidFill>
-                  <a:srgbClr val="0070C0"/>
-                </a:solidFill>
-              </a:rPr>
-              <a:t>Folders help to keep files names short</a:t>
-            </a:r>
-            <a:endParaRPr lang="en-GB" sz="2800" dirty="0" smtClean="0">
-              <a:solidFill>
-                <a:srgbClr val="0070C0"/>
-              </a:solidFill>
-            </a:endParaRPr>
-          </a:p>
-          <a:p>
-            <a:pPr marL="457200" indent="-457200">
-              <a:buFont typeface="Arial" panose="020B0604020202020204" pitchFamily="34" charset="0"/>
-              <a:buChar char="•"/>
-            </a:pPr>
+            <a:r>
+              <a:rPr lang="en-GB" sz="2800" dirty="0">
+                <a:solidFill>
+                  <a:srgbClr val="0070C0"/>
+                </a:solidFill>
+              </a:rPr>
+              <a:t>Exercise 2: </a:t>
+            </a:r>
+          </a:p>
+          <a:p>
+            <a:pPr algn="ctr"/>
             <a:endParaRPr lang="en-GB" sz="2800" dirty="0">
               <a:solidFill>
                 <a:srgbClr val="0070C0"/>
               </a:solidFill>
             </a:endParaRPr>
           </a:p>
+          <a:p>
+            <a:pPr algn="ctr"/>
+            <a:r>
+              <a:rPr lang="pl-PL" sz="2800" dirty="0" smtClean="0">
+                <a:solidFill>
+                  <a:srgbClr val="0070C0"/>
+                </a:solidFill>
+              </a:rPr>
+              <a:t>A good name</a:t>
+            </a:r>
+            <a:endParaRPr lang="en-GB" sz="2800" dirty="0">
+              <a:solidFill>
+                <a:srgbClr val="0070C0"/>
+              </a:solidFill>
+            </a:endParaRPr>
+          </a:p>
         </p:txBody>
       </p:sp>
       <p:pic>
         <p:nvPicPr>
-          <p:cNvPr id="6" name="Picture 2" descr="Ed_DaSH">
-            <a:extLst>
-              <a:ext uri="{FF2B5EF4-FFF2-40B4-BE49-F238E27FC236}">
-                <a16:creationId xmlns:a16="http://schemas.microsoft.com/office/drawing/2014/main" id="{6F3CF586-06D2-46C3-A4A3-130E31C4A16F}"/>
+          <p:cNvPr id="4" name="Picture 2" descr="Ed_DaSH">
+            <a:extLst>
+              <a:ext uri="{FF2B5EF4-FFF2-40B4-BE49-F238E27FC236}">
+                <a16:creationId xmlns:a16="http://schemas.microsoft.com/office/drawing/2014/main" id="{A783256F-E39E-4712-96B0-240BD611CFEB}"/>
               </a:ext>
             </a:extLst>
           </p:cNvPr>
@@ -5154,55 +5280,10 @@
           </a:extLst>
         </p:spPr>
       </p:pic>
-      <p:sp>
-        <p:nvSpPr>
-          <p:cNvPr id="4" name="TextBox 3">
-            <a:extLst>
-              <a:ext uri="{FF2B5EF4-FFF2-40B4-BE49-F238E27FC236}">
-                <a16:creationId xmlns:a16="http://schemas.microsoft.com/office/drawing/2014/main" id="{F4B0FDD5-5348-354F-A378-7241F2AF057B}"/>
-              </a:ext>
-            </a:extLst>
-          </p:cNvPr>
-          <p:cNvSpPr txBox="1"/>
-          <p:nvPr/>
-        </p:nvSpPr>
-        <p:spPr>
-          <a:xfrm>
-            <a:off x="1714778" y="444110"/>
-            <a:ext cx="3601692" cy="769441"/>
-          </a:xfrm>
-          <a:prstGeom prst="rect">
-            <a:avLst/>
-          </a:prstGeom>
-          <a:noFill/>
-        </p:spPr>
-        <p:txBody>
-          <a:bodyPr wrap="none" rtlCol="0">
-            <a:spAutoFit/>
-          </a:bodyPr>
-          <a:lstStyle/>
-          <a:p>
-            <a:pPr algn="ctr"/>
-            <a:r>
-              <a:rPr lang="en-GB" sz="4400" dirty="0">
-                <a:solidFill>
-                  <a:srgbClr val="0070C0"/>
-                </a:solidFill>
-              </a:rPr>
-              <a:t>Folders vs Files</a:t>
-            </a:r>
-            <a:endParaRPr lang="en-GB" sz="4400" dirty="0">
-              <a:solidFill>
-                <a:srgbClr val="0070C0"/>
-              </a:solidFill>
-            </a:endParaRPr>
-          </a:p>
-        </p:txBody>
-      </p:sp>
     </p:spTree>
     <p:extLst>
       <p:ext uri="{BB962C8B-B14F-4D97-AF65-F5344CB8AC3E}">
-        <p14:creationId xmlns:p14="http://schemas.microsoft.com/office/powerpoint/2010/main" val="3254864951"/>
+        <p14:creationId xmlns:p14="http://schemas.microsoft.com/office/powerpoint/2010/main" val="373317662"/>
       </p:ext>
     </p:extLst>
   </p:cSld>
@@ -5243,8 +5324,8 @@
         </p:nvSpPr>
         <p:spPr>
           <a:xfrm>
-            <a:off x="1363735" y="1129464"/>
-            <a:ext cx="9464530" cy="1384995"/>
+            <a:off x="847780" y="1379400"/>
+            <a:ext cx="9751569" cy="2246769"/>
           </a:xfrm>
           <a:prstGeom prst="rect">
             <a:avLst/>
@@ -5257,63 +5338,76 @@
           </a:bodyPr>
           <a:lstStyle/>
           <a:p>
-            <a:r>
-              <a:rPr lang="en-GB" sz="2800" dirty="0">
-                <a:solidFill>
-                  <a:srgbClr val="0070C0"/>
-                </a:solidFill>
-              </a:rPr>
-              <a:t>Exercise </a:t>
-            </a:r>
+            <a:pPr algn="just"/>
+            <a:endParaRPr lang="en-GB" sz="2800" u="sng" dirty="0">
+              <a:solidFill>
+                <a:srgbClr val="0070C0"/>
+              </a:solidFill>
+            </a:endParaRPr>
+          </a:p>
+          <a:p>
+            <a:pPr marL="457200" indent="-457200">
+              <a:buFont typeface="Arial" panose="020B0604020202020204" pitchFamily="34" charset="0"/>
+              <a:buChar char="•"/>
+            </a:pPr>
+            <a:r>
+              <a:rPr lang="en-GB" sz="2800" dirty="0" smtClean="0">
+                <a:solidFill>
+                  <a:srgbClr val="0070C0"/>
+                </a:solidFill>
+              </a:rPr>
+              <a:t>Folders permit grouping relevant data together</a:t>
+            </a:r>
+          </a:p>
+          <a:p>
+            <a:pPr marL="457200" indent="-457200">
+              <a:buFont typeface="Arial" panose="020B0604020202020204" pitchFamily="34" charset="0"/>
+              <a:buChar char="•"/>
+            </a:pPr>
+            <a:endParaRPr lang="en-GB" sz="2800" dirty="0" smtClean="0">
+              <a:solidFill>
+                <a:srgbClr val="0070C0"/>
+              </a:solidFill>
+            </a:endParaRPr>
+          </a:p>
+          <a:p>
+            <a:pPr marL="457200" indent="-457200">
+              <a:buFont typeface="Arial" panose="020B0604020202020204" pitchFamily="34" charset="0"/>
+              <a:buChar char="•"/>
+            </a:pPr>
             <a:r>
               <a:rPr lang="pl-PL" sz="2800" dirty="0" smtClean="0">
                 <a:solidFill>
                   <a:srgbClr val="0070C0"/>
                 </a:solidFill>
               </a:rPr>
-              <a:t>3</a:t>
-            </a:r>
-            <a:r>
-              <a:rPr lang="en-GB" sz="2800" dirty="0" smtClean="0">
-                <a:solidFill>
-                  <a:srgbClr val="0070C0"/>
-                </a:solidFill>
-              </a:rPr>
-              <a:t>: </a:t>
-            </a:r>
+              <a:t>Folders help to keep files names short</a:t>
+            </a:r>
+            <a:endParaRPr lang="en-GB" sz="2800" dirty="0" smtClean="0">
+              <a:solidFill>
+                <a:srgbClr val="0070C0"/>
+              </a:solidFill>
+            </a:endParaRPr>
+          </a:p>
+          <a:p>
+            <a:pPr marL="457200" indent="-457200">
+              <a:buFont typeface="Arial" panose="020B0604020202020204" pitchFamily="34" charset="0"/>
+              <a:buChar char="•"/>
+            </a:pPr>
             <a:endParaRPr lang="en-GB" sz="2800" dirty="0">
               <a:solidFill>
                 <a:srgbClr val="0070C0"/>
               </a:solidFill>
             </a:endParaRPr>
           </a:p>
-          <a:p>
-            <a:pPr algn="ctr"/>
-            <a:endParaRPr lang="en-GB" sz="2800" dirty="0">
-              <a:solidFill>
-                <a:srgbClr val="0070C0"/>
-              </a:solidFill>
-            </a:endParaRPr>
-          </a:p>
-          <a:p>
-            <a:pPr algn="ctr"/>
-            <a:r>
-              <a:rPr lang="en-GB" sz="2800" dirty="0">
-                <a:solidFill>
-                  <a:srgbClr val="0070C0"/>
-                </a:solidFill>
-              </a:rPr>
-              <a:t>Folders vs Files</a:t>
-            </a:r>
-          </a:p>
         </p:txBody>
       </p:sp>
       <p:pic>
         <p:nvPicPr>
-          <p:cNvPr id="4" name="Picture 2" descr="Ed_DaSH">
-            <a:extLst>
-              <a:ext uri="{FF2B5EF4-FFF2-40B4-BE49-F238E27FC236}">
-                <a16:creationId xmlns:a16="http://schemas.microsoft.com/office/drawing/2014/main" id="{A783256F-E39E-4712-96B0-240BD611CFEB}"/>
+          <p:cNvPr id="6" name="Picture 2" descr="Ed_DaSH">
+            <a:extLst>
+              <a:ext uri="{FF2B5EF4-FFF2-40B4-BE49-F238E27FC236}">
+                <a16:creationId xmlns:a16="http://schemas.microsoft.com/office/drawing/2014/main" id="{6F3CF586-06D2-46C3-A4A3-130E31C4A16F}"/>
               </a:ext>
             </a:extLst>
           </p:cNvPr>
@@ -5355,6 +5449,202 @@
           </a:extLst>
         </p:spPr>
       </p:pic>
+      <p:sp>
+        <p:nvSpPr>
+          <p:cNvPr id="4" name="TextBox 3">
+            <a:extLst>
+              <a:ext uri="{FF2B5EF4-FFF2-40B4-BE49-F238E27FC236}">
+                <a16:creationId xmlns:a16="http://schemas.microsoft.com/office/drawing/2014/main" id="{F4B0FDD5-5348-354F-A378-7241F2AF057B}"/>
+              </a:ext>
+            </a:extLst>
+          </p:cNvPr>
+          <p:cNvSpPr txBox="1"/>
+          <p:nvPr/>
+        </p:nvSpPr>
+        <p:spPr>
+          <a:xfrm>
+            <a:off x="1714778" y="444110"/>
+            <a:ext cx="3601692" cy="769441"/>
+          </a:xfrm>
+          <a:prstGeom prst="rect">
+            <a:avLst/>
+          </a:prstGeom>
+          <a:noFill/>
+        </p:spPr>
+        <p:txBody>
+          <a:bodyPr wrap="none" rtlCol="0">
+            <a:spAutoFit/>
+          </a:bodyPr>
+          <a:lstStyle/>
+          <a:p>
+            <a:pPr algn="ctr"/>
+            <a:r>
+              <a:rPr lang="en-GB" sz="4400" dirty="0">
+                <a:solidFill>
+                  <a:srgbClr val="0070C0"/>
+                </a:solidFill>
+              </a:rPr>
+              <a:t>Folders vs Files</a:t>
+            </a:r>
+          </a:p>
+        </p:txBody>
+      </p:sp>
+    </p:spTree>
+    <p:extLst>
+      <p:ext uri="{BB962C8B-B14F-4D97-AF65-F5344CB8AC3E}">
+        <p14:creationId xmlns:p14="http://schemas.microsoft.com/office/powerpoint/2010/main" val="3254864951"/>
+      </p:ext>
+    </p:extLst>
+  </p:cSld>
+  <p:clrMapOvr>
+    <a:masterClrMapping/>
+  </p:clrMapOvr>
+</p:sld>
+</file>
+
+<file path=ppt/slides/slide15.xml><?xml version="1.0" encoding="utf-8"?>
+<p:sld xmlns:a="http://schemas.openxmlformats.org/drawingml/2006/main" xmlns:r="http://schemas.openxmlformats.org/officeDocument/2006/relationships" xmlns:p="http://schemas.openxmlformats.org/presentationml/2006/main">
+  <p:cSld>
+    <p:spTree>
+      <p:nvGrpSpPr>
+        <p:cNvPr id="1" name=""/>
+        <p:cNvGrpSpPr/>
+        <p:nvPr/>
+      </p:nvGrpSpPr>
+      <p:grpSpPr>
+        <a:xfrm>
+          <a:off x="0" y="0"/>
+          <a:ext cx="0" cy="0"/>
+          <a:chOff x="0" y="0"/>
+          <a:chExt cx="0" cy="0"/>
+        </a:xfrm>
+      </p:grpSpPr>
+      <p:sp>
+        <p:nvSpPr>
+          <p:cNvPr id="5" name="TextBox 4">
+            <a:extLst>
+              <a:ext uri="{FF2B5EF4-FFF2-40B4-BE49-F238E27FC236}">
+                <a16:creationId xmlns:a16="http://schemas.microsoft.com/office/drawing/2014/main" id="{3A7A1F5C-9C70-4DE3-BA39-7835B2935EB3}"/>
+              </a:ext>
+            </a:extLst>
+          </p:cNvPr>
+          <p:cNvSpPr txBox="1"/>
+          <p:nvPr/>
+        </p:nvSpPr>
+        <p:spPr>
+          <a:xfrm>
+            <a:off x="1363735" y="1129464"/>
+            <a:ext cx="9464530" cy="1384995"/>
+          </a:xfrm>
+          <a:prstGeom prst="rect">
+            <a:avLst/>
+          </a:prstGeom>
+          <a:noFill/>
+        </p:spPr>
+        <p:txBody>
+          <a:bodyPr wrap="square">
+            <a:spAutoFit/>
+          </a:bodyPr>
+          <a:lstStyle/>
+          <a:p>
+            <a:r>
+              <a:rPr lang="en-GB" sz="2800" dirty="0">
+                <a:solidFill>
+                  <a:srgbClr val="0070C0"/>
+                </a:solidFill>
+              </a:rPr>
+              <a:t>Exercise </a:t>
+            </a:r>
+            <a:r>
+              <a:rPr lang="pl-PL" sz="2800" dirty="0" smtClean="0">
+                <a:solidFill>
+                  <a:srgbClr val="0070C0"/>
+                </a:solidFill>
+              </a:rPr>
+              <a:t>3</a:t>
+            </a:r>
+            <a:r>
+              <a:rPr lang="en-GB" sz="2800" dirty="0" smtClean="0">
+                <a:solidFill>
+                  <a:srgbClr val="0070C0"/>
+                </a:solidFill>
+              </a:rPr>
+              <a:t>: </a:t>
+            </a:r>
+            <a:endParaRPr lang="en-GB" sz="2800" dirty="0">
+              <a:solidFill>
+                <a:srgbClr val="0070C0"/>
+              </a:solidFill>
+            </a:endParaRPr>
+          </a:p>
+          <a:p>
+            <a:pPr algn="ctr"/>
+            <a:endParaRPr lang="en-GB" sz="2800" dirty="0">
+              <a:solidFill>
+                <a:srgbClr val="0070C0"/>
+              </a:solidFill>
+            </a:endParaRPr>
+          </a:p>
+          <a:p>
+            <a:pPr algn="ctr"/>
+            <a:r>
+              <a:rPr lang="en-GB" sz="2800" dirty="0">
+                <a:solidFill>
+                  <a:srgbClr val="0070C0"/>
+                </a:solidFill>
+              </a:rPr>
+              <a:t>Folders vs Files</a:t>
+            </a:r>
+          </a:p>
+        </p:txBody>
+      </p:sp>
+      <p:pic>
+        <p:nvPicPr>
+          <p:cNvPr id="4" name="Picture 2" descr="Ed_DaSH">
+            <a:extLst>
+              <a:ext uri="{FF2B5EF4-FFF2-40B4-BE49-F238E27FC236}">
+                <a16:creationId xmlns:a16="http://schemas.microsoft.com/office/drawing/2014/main" id="{A783256F-E39E-4712-96B0-240BD611CFEB}"/>
+              </a:ext>
+            </a:extLst>
+          </p:cNvPr>
+          <p:cNvPicPr>
+            <a:picLocks noChangeAspect="1" noChangeArrowheads="1"/>
+          </p:cNvPicPr>
+          <p:nvPr/>
+        </p:nvPicPr>
+        <p:blipFill>
+          <a:blip r:embed="rId2" cstate="hqprint">
+            <a:extLst>
+              <a:ext uri="{28A0092B-C50C-407E-A947-70E740481C1C}">
+                <a14:useLocalDpi xmlns:a14="http://schemas.microsoft.com/office/drawing/2010/main" val="0"/>
+              </a:ext>
+            </a:extLst>
+          </a:blip>
+          <a:srcRect/>
+          <a:stretch>
+            <a:fillRect/>
+          </a:stretch>
+        </p:blipFill>
+        <p:spPr bwMode="auto">
+          <a:xfrm>
+            <a:off x="10820670" y="5458691"/>
+            <a:ext cx="1289214" cy="1325418"/>
+          </a:xfrm>
+          <a:prstGeom prst="rect">
+            <a:avLst/>
+          </a:prstGeom>
+          <a:noFill/>
+          <a:extLst>
+            <a:ext uri="{909E8E84-426E-40DD-AFC4-6F175D3DCCD1}">
+              <a14:hiddenFill xmlns:a14="http://schemas.microsoft.com/office/drawing/2010/main">
+                <a:solidFill>
+                  <a:srgbClr val="FFFFFF"/>
+                </a:solidFill>
+              </a14:hiddenFill>
+            </a:ext>
+          </a:extLst>
+        </p:spPr>
+      </p:pic>
     </p:spTree>
     <p:extLst>
       <p:ext uri="{BB962C8B-B14F-4D97-AF65-F5344CB8AC3E}">
@@ -5368,7 +5658,7 @@
 </p:sld>
 </file>
 
-<file path=ppt/slides/slide15.xml><?xml version="1.0" encoding="utf-8"?>
+<file path=ppt/slides/slide16.xml><?xml version="1.0" encoding="utf-8"?>
 <p:sld xmlns:a="http://schemas.openxmlformats.org/drawingml/2006/main" xmlns:r="http://schemas.openxmlformats.org/officeDocument/2006/relationships" xmlns:p="http://schemas.openxmlformats.org/presentationml/2006/main">
   <p:cSld>
     <p:spTree>
@@ -5421,7 +5711,7 @@
 </p:sld>
 </file>
 
-<file path=ppt/slides/slide16.xml><?xml version="1.0" encoding="utf-8"?>
+<file path=ppt/slides/slide17.xml><?xml version="1.0" encoding="utf-8"?>
 <p:sld xmlns:a="http://schemas.openxmlformats.org/drawingml/2006/main" xmlns:r="http://schemas.openxmlformats.org/officeDocument/2006/relationships" xmlns:p="http://schemas.openxmlformats.org/presentationml/2006/main">
   <p:cSld>
     <p:spTree>
@@ -5474,7 +5764,7 @@
 </p:sld>
 </file>
 
-<file path=ppt/slides/slide17.xml><?xml version="1.0" encoding="utf-8"?>
+<file path=ppt/slides/slide18.xml><?xml version="1.0" encoding="utf-8"?>
 <p:sld xmlns:a="http://schemas.openxmlformats.org/drawingml/2006/main" xmlns:r="http://schemas.openxmlformats.org/officeDocument/2006/relationships" xmlns:p="http://schemas.openxmlformats.org/presentationml/2006/main">
   <p:cSld>
     <p:spTree>
@@ -5606,253 +5896,6 @@
     <p:extLst>
       <p:ext uri="{BB962C8B-B14F-4D97-AF65-F5344CB8AC3E}">
         <p14:creationId xmlns:p14="http://schemas.microsoft.com/office/powerpoint/2010/main" val="313528210"/>
-      </p:ext>
-    </p:extLst>
-  </p:cSld>
-  <p:clrMapOvr>
-    <a:masterClrMapping/>
-  </p:clrMapOvr>
-</p:sld>
-</file>
-
-<file path=ppt/slides/slide18.xml><?xml version="1.0" encoding="utf-8"?>
-<p:sld xmlns:a="http://schemas.openxmlformats.org/drawingml/2006/main" xmlns:r="http://schemas.openxmlformats.org/officeDocument/2006/relationships" xmlns:p="http://schemas.openxmlformats.org/presentationml/2006/main">
-  <p:cSld>
-    <p:spTree>
-      <p:nvGrpSpPr>
-        <p:cNvPr id="1" name=""/>
-        <p:cNvGrpSpPr/>
-        <p:nvPr/>
-      </p:nvGrpSpPr>
-      <p:grpSpPr>
-        <a:xfrm>
-          <a:off x="0" y="0"/>
-          <a:ext cx="0" cy="0"/>
-          <a:chOff x="0" y="0"/>
-          <a:chExt cx="0" cy="0"/>
-        </a:xfrm>
-      </p:grpSpPr>
-      <p:sp>
-        <p:nvSpPr>
-          <p:cNvPr id="5" name="TextBox 4">
-            <a:extLst>
-              <a:ext uri="{FF2B5EF4-FFF2-40B4-BE49-F238E27FC236}">
-                <a16:creationId xmlns:a16="http://schemas.microsoft.com/office/drawing/2014/main" id="{3A7A1F5C-9C70-4DE3-BA39-7835B2935EB3}"/>
-              </a:ext>
-            </a:extLst>
-          </p:cNvPr>
-          <p:cNvSpPr txBox="1"/>
-          <p:nvPr/>
-        </p:nvSpPr>
-        <p:spPr>
-          <a:xfrm>
-            <a:off x="987288" y="858421"/>
-            <a:ext cx="8837169" cy="5262979"/>
-          </a:xfrm>
-          <a:prstGeom prst="rect">
-            <a:avLst/>
-          </a:prstGeom>
-          <a:noFill/>
-        </p:spPr>
-        <p:txBody>
-          <a:bodyPr wrap="square">
-            <a:spAutoFit/>
-          </a:bodyPr>
-          <a:lstStyle/>
-          <a:p>
-            <a:pPr marL="457200" indent="-457200">
-              <a:buFont typeface="Arial" panose="020B0604020202020204" pitchFamily="34" charset="0"/>
-              <a:buChar char="•"/>
-            </a:pPr>
-            <a:r>
-              <a:rPr lang="en-GB" sz="2800" dirty="0">
-                <a:solidFill>
-                  <a:srgbClr val="0070C0"/>
-                </a:solidFill>
-              </a:rPr>
-              <a:t>Use folders to group related files. A single folder will make it easy to locate them</a:t>
-            </a:r>
-            <a:r>
-              <a:rPr lang="en-GB" sz="2800" dirty="0" smtClean="0">
-                <a:solidFill>
-                  <a:srgbClr val="0070C0"/>
-                </a:solidFill>
-              </a:rPr>
-              <a:t>.</a:t>
-            </a:r>
-            <a:endParaRPr lang="pl-PL" sz="2800" dirty="0" smtClean="0">
-              <a:solidFill>
-                <a:srgbClr val="0070C0"/>
-              </a:solidFill>
-            </a:endParaRPr>
-          </a:p>
-          <a:p>
-            <a:pPr marL="457200" indent="-457200">
-              <a:buFont typeface="Arial" panose="020B0604020202020204" pitchFamily="34" charset="0"/>
-              <a:buChar char="•"/>
-            </a:pPr>
-            <a:endParaRPr lang="pl-PL" sz="2800" dirty="0" smtClean="0">
-              <a:solidFill>
-                <a:srgbClr val="0070C0"/>
-              </a:solidFill>
-            </a:endParaRPr>
-          </a:p>
-          <a:p>
-            <a:pPr marL="457200" indent="-457200">
-              <a:buFont typeface="Arial" panose="020B0604020202020204" pitchFamily="34" charset="0"/>
-              <a:buChar char="•"/>
-            </a:pPr>
-            <a:r>
-              <a:rPr lang="en-GB" sz="2800" dirty="0" smtClean="0">
-                <a:solidFill>
-                  <a:srgbClr val="0070C0"/>
-                </a:solidFill>
-              </a:rPr>
-              <a:t>Name </a:t>
-            </a:r>
-            <a:r>
-              <a:rPr lang="en-GB" sz="2800" dirty="0">
-                <a:solidFill>
-                  <a:srgbClr val="0070C0"/>
-                </a:solidFill>
-              </a:rPr>
-              <a:t>folders appropriately: use descriptive names after the areas of work to which they relate</a:t>
-            </a:r>
-            <a:r>
-              <a:rPr lang="en-GB" sz="2800" dirty="0" smtClean="0">
-                <a:solidFill>
-                  <a:srgbClr val="0070C0"/>
-                </a:solidFill>
-              </a:rPr>
-              <a:t>.</a:t>
-            </a:r>
-            <a:endParaRPr lang="pl-PL" sz="2800" dirty="0" smtClean="0">
-              <a:solidFill>
-                <a:srgbClr val="0070C0"/>
-              </a:solidFill>
-            </a:endParaRPr>
-          </a:p>
-          <a:p>
-            <a:pPr marL="457200" indent="-457200">
-              <a:buFont typeface="Arial" panose="020B0604020202020204" pitchFamily="34" charset="0"/>
-              <a:buChar char="•"/>
-            </a:pPr>
-            <a:endParaRPr lang="en-GB" sz="2800" dirty="0">
-              <a:solidFill>
-                <a:srgbClr val="0070C0"/>
-              </a:solidFill>
-            </a:endParaRPr>
-          </a:p>
-          <a:p>
-            <a:pPr marL="457200" indent="-457200">
-              <a:buFont typeface="Arial" panose="020B0604020202020204" pitchFamily="34" charset="0"/>
-              <a:buChar char="•"/>
-            </a:pPr>
-            <a:r>
-              <a:rPr lang="en-GB" sz="2800" dirty="0">
-                <a:solidFill>
-                  <a:srgbClr val="0070C0"/>
-                </a:solidFill>
-              </a:rPr>
-              <a:t>Structure folders hierarchically: use broader topics for your main folders and increase in specificity as you go down the hierarchy</a:t>
-            </a:r>
-            <a:r>
-              <a:rPr lang="en-GB" sz="2800" dirty="0" smtClean="0">
-                <a:solidFill>
-                  <a:srgbClr val="0070C0"/>
-                </a:solidFill>
-              </a:rPr>
-              <a:t>.</a:t>
-            </a:r>
-            <a:endParaRPr lang="pl-PL" sz="2800" dirty="0" smtClean="0">
-              <a:solidFill>
-                <a:srgbClr val="0070C0"/>
-              </a:solidFill>
-            </a:endParaRPr>
-          </a:p>
-          <a:p>
-            <a:pPr marL="457200" indent="-457200">
-              <a:buFont typeface="Arial" panose="020B0604020202020204" pitchFamily="34" charset="0"/>
-              <a:buChar char="•"/>
-            </a:pPr>
-            <a:endParaRPr lang="en-GB" sz="2800" dirty="0">
-              <a:solidFill>
-                <a:srgbClr val="0070C0"/>
-              </a:solidFill>
-            </a:endParaRPr>
-          </a:p>
-          <a:p>
-            <a:pPr marL="457200" indent="-457200">
-              <a:buFont typeface="Arial" panose="020B0604020202020204" pitchFamily="34" charset="0"/>
-              <a:buChar char="•"/>
-            </a:pPr>
-            <a:r>
-              <a:rPr lang="en-GB" sz="2800" dirty="0">
-                <a:solidFill>
-                  <a:srgbClr val="0070C0"/>
-                </a:solidFill>
-              </a:rPr>
-              <a:t>Be consistent: agree on a naming convention from the outset of your research project</a:t>
-            </a:r>
-            <a:endParaRPr lang="en-GB" sz="2800" dirty="0">
-              <a:solidFill>
-                <a:srgbClr val="0070C0"/>
-              </a:solidFill>
-            </a:endParaRPr>
-          </a:p>
-        </p:txBody>
-      </p:sp>
-      <p:pic>
-        <p:nvPicPr>
-          <p:cNvPr id="6" name="Picture 2" descr="Ed_DaSH">
-            <a:extLst>
-              <a:ext uri="{FF2B5EF4-FFF2-40B4-BE49-F238E27FC236}">
-                <a16:creationId xmlns:a16="http://schemas.microsoft.com/office/drawing/2014/main" id="{6F3CF586-06D2-46C3-A4A3-130E31C4A16F}"/>
-              </a:ext>
-            </a:extLst>
-          </p:cNvPr>
-          <p:cNvPicPr>
-            <a:picLocks noChangeAspect="1" noChangeArrowheads="1"/>
-          </p:cNvPicPr>
-          <p:nvPr/>
-        </p:nvPicPr>
-        <p:blipFill>
-          <a:blip r:embed="rId2" cstate="hqprint">
-            <a:extLst>
-              <a:ext uri="{28A0092B-C50C-407E-A947-70E740481C1C}">
-                <a14:useLocalDpi xmlns:a14="http://schemas.microsoft.com/office/drawing/2010/main" val="0"/>
-              </a:ext>
-            </a:extLst>
-          </a:blip>
-          <a:srcRect/>
-          <a:stretch>
-            <a:fillRect/>
-          </a:stretch>
-        </p:blipFill>
-        <p:spPr bwMode="auto">
-          <a:xfrm>
-            <a:off x="10820670" y="5458691"/>
-            <a:ext cx="1289214" cy="1325418"/>
-          </a:xfrm>
-          <a:prstGeom prst="rect">
-            <a:avLst/>
-          </a:prstGeom>
-          <a:noFill/>
-          <a:extLst>
-            <a:ext uri="{909E8E84-426E-40DD-AFC4-6F175D3DCCD1}">
-              <a14:hiddenFill xmlns:a14="http://schemas.microsoft.com/office/drawing/2010/main">
-                <a:solidFill>
-                  <a:srgbClr val="FFFFFF"/>
-                </a:solidFill>
-              </a14:hiddenFill>
-            </a:ext>
-          </a:extLst>
-        </p:spPr>
-      </p:pic>
-    </p:spTree>
-    <p:extLst>
-      <p:ext uri="{BB962C8B-B14F-4D97-AF65-F5344CB8AC3E}">
-        <p14:creationId xmlns:p14="http://schemas.microsoft.com/office/powerpoint/2010/main" val="2431730110"/>
       </p:ext>
     </p:extLst>
   </p:cSld>
@@ -5893,8 +5936,8 @@
         </p:nvSpPr>
         <p:spPr>
           <a:xfrm>
-            <a:off x="1363735" y="1129464"/>
-            <a:ext cx="9464530" cy="1384995"/>
+            <a:off x="987288" y="858421"/>
+            <a:ext cx="8837169" cy="5262979"/>
           </a:xfrm>
           <a:prstGeom prst="rect">
             <a:avLst/>
@@ -5907,17 +5950,83 @@
           </a:bodyPr>
           <a:lstStyle/>
           <a:p>
+            <a:pPr marL="457200" indent="-457200">
+              <a:buFont typeface="Arial" panose="020B0604020202020204" pitchFamily="34" charset="0"/>
+              <a:buChar char="•"/>
+            </a:pPr>
             <a:r>
               <a:rPr lang="en-GB" sz="2800" dirty="0">
                 <a:solidFill>
                   <a:srgbClr val="0070C0"/>
                 </a:solidFill>
               </a:rPr>
-              <a:t>Exercise 3: </a:t>
-            </a:r>
-          </a:p>
-          <a:p>
-            <a:pPr algn="ctr"/>
+              <a:t>Use folders to group related files. A single folder will make it easy to locate them</a:t>
+            </a:r>
+            <a:r>
+              <a:rPr lang="en-GB" sz="2800" dirty="0" smtClean="0">
+                <a:solidFill>
+                  <a:srgbClr val="0070C0"/>
+                </a:solidFill>
+              </a:rPr>
+              <a:t>.</a:t>
+            </a:r>
+            <a:endParaRPr lang="pl-PL" sz="2800" dirty="0" smtClean="0">
+              <a:solidFill>
+                <a:srgbClr val="0070C0"/>
+              </a:solidFill>
+            </a:endParaRPr>
+          </a:p>
+          <a:p>
+            <a:pPr marL="457200" indent="-457200">
+              <a:buFont typeface="Arial" panose="020B0604020202020204" pitchFamily="34" charset="0"/>
+              <a:buChar char="•"/>
+            </a:pPr>
+            <a:endParaRPr lang="pl-PL" sz="2800" dirty="0" smtClean="0">
+              <a:solidFill>
+                <a:srgbClr val="0070C0"/>
+              </a:solidFill>
+            </a:endParaRPr>
+          </a:p>
+          <a:p>
+            <a:pPr marL="457200" indent="-457200">
+              <a:buFont typeface="Arial" panose="020B0604020202020204" pitchFamily="34" charset="0"/>
+              <a:buChar char="•"/>
+            </a:pPr>
+            <a:r>
+              <a:rPr lang="en-GB" sz="2800" dirty="0" smtClean="0">
+                <a:solidFill>
+                  <a:srgbClr val="0070C0"/>
+                </a:solidFill>
+              </a:rPr>
+              <a:t>Name </a:t>
+            </a:r>
+            <a:r>
+              <a:rPr lang="en-GB" sz="2800" dirty="0">
+                <a:solidFill>
+                  <a:srgbClr val="0070C0"/>
+                </a:solidFill>
+              </a:rPr>
+              <a:t>folders appropriately: use descriptive names after the areas of work to which they relate</a:t>
+            </a:r>
+            <a:r>
+              <a:rPr lang="en-GB" sz="2800" dirty="0" smtClean="0">
+                <a:solidFill>
+                  <a:srgbClr val="0070C0"/>
+                </a:solidFill>
+              </a:rPr>
+              <a:t>.</a:t>
+            </a:r>
+            <a:endParaRPr lang="pl-PL" sz="2800" dirty="0" smtClean="0">
+              <a:solidFill>
+                <a:srgbClr val="0070C0"/>
+              </a:solidFill>
+            </a:endParaRPr>
+          </a:p>
+          <a:p>
+            <a:pPr marL="457200" indent="-457200">
+              <a:buFont typeface="Arial" panose="020B0604020202020204" pitchFamily="34" charset="0"/>
+              <a:buChar char="•"/>
+            </a:pPr>
             <a:endParaRPr lang="en-GB" sz="2800" dirty="0">
               <a:solidFill>
                 <a:srgbClr val="0070C0"/>
@@ -5925,24 +6034,65 @@
             </a:endParaRPr>
           </a:p>
           <a:p>
-            <a:pPr algn="ctr"/>
+            <a:pPr marL="457200" indent="-457200">
+              <a:buFont typeface="Arial" panose="020B0604020202020204" pitchFamily="34" charset="0"/>
+              <a:buChar char="•"/>
+            </a:pPr>
             <a:r>
               <a:rPr lang="en-GB" sz="2800" dirty="0">
                 <a:solidFill>
                   <a:srgbClr val="0070C0"/>
                 </a:solidFill>
               </a:rPr>
-              <a:t>Organization for computing</a:t>
+              <a:t>Structure folders hierarchically: use broader topics for your main folders and increase in specificity as you go down the hierarchy</a:t>
+            </a:r>
+            <a:r>
+              <a:rPr lang="en-GB" sz="2800" dirty="0" smtClean="0">
+                <a:solidFill>
+                  <a:srgbClr val="0070C0"/>
+                </a:solidFill>
+              </a:rPr>
+              <a:t>.</a:t>
+            </a:r>
+            <a:endParaRPr lang="pl-PL" sz="2800" dirty="0" smtClean="0">
+              <a:solidFill>
+                <a:srgbClr val="0070C0"/>
+              </a:solidFill>
+            </a:endParaRPr>
+          </a:p>
+          <a:p>
+            <a:pPr marL="457200" indent="-457200">
+              <a:buFont typeface="Arial" panose="020B0604020202020204" pitchFamily="34" charset="0"/>
+              <a:buChar char="•"/>
+            </a:pPr>
+            <a:endParaRPr lang="en-GB" sz="2800" dirty="0">
+              <a:solidFill>
+                <a:srgbClr val="0070C0"/>
+              </a:solidFill>
+            </a:endParaRPr>
+          </a:p>
+          <a:p>
+            <a:pPr marL="457200" indent="-457200">
+              <a:buFont typeface="Arial" panose="020B0604020202020204" pitchFamily="34" charset="0"/>
+              <a:buChar char="•"/>
+            </a:pPr>
+            <a:r>
+              <a:rPr lang="en-GB" sz="2800" dirty="0">
+                <a:solidFill>
+                  <a:srgbClr val="0070C0"/>
+                </a:solidFill>
+              </a:rPr>
+              <a:t>Be consistent: agree on a naming convention from the outset of your research project</a:t>
             </a:r>
           </a:p>
         </p:txBody>
       </p:sp>
       <p:pic>
         <p:nvPicPr>
-          <p:cNvPr id="4" name="Picture 2" descr="Ed_DaSH">
-            <a:extLst>
-              <a:ext uri="{FF2B5EF4-FFF2-40B4-BE49-F238E27FC236}">
-                <a16:creationId xmlns:a16="http://schemas.microsoft.com/office/drawing/2014/main" id="{A783256F-E39E-4712-96B0-240BD611CFEB}"/>
+          <p:cNvPr id="6" name="Picture 2" descr="Ed_DaSH">
+            <a:extLst>
+              <a:ext uri="{FF2B5EF4-FFF2-40B4-BE49-F238E27FC236}">
+                <a16:creationId xmlns:a16="http://schemas.microsoft.com/office/drawing/2014/main" id="{6F3CF586-06D2-46C3-A4A3-130E31C4A16F}"/>
               </a:ext>
             </a:extLst>
           </p:cNvPr>
@@ -5987,7 +6137,7 @@
     </p:spTree>
     <p:extLst>
       <p:ext uri="{BB962C8B-B14F-4D97-AF65-F5344CB8AC3E}">
-        <p14:creationId xmlns:p14="http://schemas.microsoft.com/office/powerpoint/2010/main" val="1908239480"/>
+        <p14:creationId xmlns:p14="http://schemas.microsoft.com/office/powerpoint/2010/main" val="2431730110"/>
       </p:ext>
     </p:extLst>
   </p:cSld>
@@ -6320,12 +6470,83 @@
           <a:chExt cx="0" cy="0"/>
         </a:xfrm>
       </p:grpSpPr>
+      <p:sp>
+        <p:nvSpPr>
+          <p:cNvPr id="5" name="TextBox 4">
+            <a:extLst>
+              <a:ext uri="{FF2B5EF4-FFF2-40B4-BE49-F238E27FC236}">
+                <a16:creationId xmlns:a16="http://schemas.microsoft.com/office/drawing/2014/main" id="{3A7A1F5C-9C70-4DE3-BA39-7835B2935EB3}"/>
+              </a:ext>
+            </a:extLst>
+          </p:cNvPr>
+          <p:cNvSpPr txBox="1"/>
+          <p:nvPr/>
+        </p:nvSpPr>
+        <p:spPr>
+          <a:xfrm>
+            <a:off x="1363735" y="1129464"/>
+            <a:ext cx="9464530" cy="1384995"/>
+          </a:xfrm>
+          <a:prstGeom prst="rect">
+            <a:avLst/>
+          </a:prstGeom>
+          <a:noFill/>
+        </p:spPr>
+        <p:txBody>
+          <a:bodyPr wrap="square">
+            <a:spAutoFit/>
+          </a:bodyPr>
+          <a:lstStyle/>
+          <a:p>
+            <a:r>
+              <a:rPr lang="en-GB" sz="2800" dirty="0">
+                <a:solidFill>
+                  <a:srgbClr val="0070C0"/>
+                </a:solidFill>
+              </a:rPr>
+              <a:t>Exercise 3: </a:t>
+            </a:r>
+          </a:p>
+          <a:p>
+            <a:pPr algn="ctr"/>
+            <a:endParaRPr lang="en-GB" sz="2800" dirty="0">
+              <a:solidFill>
+                <a:srgbClr val="0070C0"/>
+              </a:solidFill>
+            </a:endParaRPr>
+          </a:p>
+          <a:p>
+            <a:pPr algn="ctr"/>
+            <a:r>
+              <a:rPr lang="en-GB" sz="2800" dirty="0">
+                <a:solidFill>
+                  <a:srgbClr val="0070C0"/>
+                </a:solidFill>
+              </a:rPr>
+              <a:t>Organization </a:t>
+            </a:r>
+            <a:r>
+              <a:rPr lang="pl-PL" sz="2800" dirty="0" smtClean="0">
+                <a:solidFill>
+                  <a:srgbClr val="0070C0"/>
+                </a:solidFill>
+              </a:rPr>
+              <a:t>strategies</a:t>
+            </a:r>
+            <a:endParaRPr lang="en-GB" sz="2800" dirty="0">
+              <a:solidFill>
+                <a:srgbClr val="0070C0"/>
+              </a:solidFill>
+            </a:endParaRPr>
+          </a:p>
+        </p:txBody>
+      </p:sp>
       <p:pic>
         <p:nvPicPr>
-          <p:cNvPr id="6" name="Picture 2" descr="Ed_DaSH">
-            <a:extLst>
-              <a:ext uri="{FF2B5EF4-FFF2-40B4-BE49-F238E27FC236}">
-                <a16:creationId xmlns:a16="http://schemas.microsoft.com/office/drawing/2014/main" id="{6F3CF586-06D2-46C3-A4A3-130E31C4A16F}"/>
+          <p:cNvPr id="4" name="Picture 2" descr="Ed_DaSH">
+            <a:extLst>
+              <a:ext uri="{FF2B5EF4-FFF2-40B4-BE49-F238E27FC236}">
+                <a16:creationId xmlns:a16="http://schemas.microsoft.com/office/drawing/2014/main" id="{A783256F-E39E-4712-96B0-240BD611CFEB}"/>
               </a:ext>
             </a:extLst>
           </p:cNvPr>
@@ -6367,194 +6588,10 @@
           </a:extLst>
         </p:spPr>
       </p:pic>
-      <p:sp>
-        <p:nvSpPr>
-          <p:cNvPr id="4" name="TextBox 3">
-            <a:extLst>
-              <a:ext uri="{FF2B5EF4-FFF2-40B4-BE49-F238E27FC236}">
-                <a16:creationId xmlns:a16="http://schemas.microsoft.com/office/drawing/2014/main" id="{F4B0FDD5-5348-354F-A378-7241F2AF057B}"/>
-              </a:ext>
-            </a:extLst>
-          </p:cNvPr>
-          <p:cNvSpPr txBox="1"/>
-          <p:nvPr/>
-        </p:nvSpPr>
-        <p:spPr>
-          <a:xfrm>
-            <a:off x="488283" y="215448"/>
-            <a:ext cx="9348713" cy="769441"/>
-          </a:xfrm>
-          <a:prstGeom prst="rect">
-            <a:avLst/>
-          </a:prstGeom>
-          <a:noFill/>
-        </p:spPr>
-        <p:txBody>
-          <a:bodyPr wrap="none" rtlCol="0">
-            <a:spAutoFit/>
-          </a:bodyPr>
-          <a:lstStyle/>
-          <a:p>
-            <a:pPr algn="ctr"/>
-            <a:r>
-              <a:rPr lang="en-GB" sz="4400" dirty="0">
-                <a:solidFill>
-                  <a:srgbClr val="0070C0"/>
-                </a:solidFill>
-              </a:rPr>
-              <a:t>Backing up your project files and folders</a:t>
-            </a:r>
-          </a:p>
-        </p:txBody>
-      </p:sp>
-      <p:sp>
-        <p:nvSpPr>
-          <p:cNvPr id="9" name="TextBox 8">
-            <a:extLst>
-              <a:ext uri="{FF2B5EF4-FFF2-40B4-BE49-F238E27FC236}">
-                <a16:creationId xmlns:a16="http://schemas.microsoft.com/office/drawing/2014/main" id="{BAD6A8BB-6E1B-5E43-83C2-4F8F05A73369}"/>
-              </a:ext>
-            </a:extLst>
-          </p:cNvPr>
-          <p:cNvSpPr txBox="1"/>
-          <p:nvPr/>
-        </p:nvSpPr>
-        <p:spPr>
-          <a:xfrm>
-            <a:off x="948099" y="1355649"/>
-            <a:ext cx="10048452" cy="4401205"/>
-          </a:xfrm>
-          <a:prstGeom prst="rect">
-            <a:avLst/>
-          </a:prstGeom>
-          <a:noFill/>
-        </p:spPr>
-        <p:txBody>
-          <a:bodyPr wrap="square">
-            <a:spAutoFit/>
-          </a:bodyPr>
-          <a:lstStyle/>
-          <a:p>
-            <a:pPr marL="457200" indent="-457200">
-              <a:buFont typeface="Arial" panose="020B0604020202020204" pitchFamily="34" charset="0"/>
-              <a:buChar char="•"/>
-            </a:pPr>
-            <a:r>
-              <a:rPr lang="en-GB" sz="2800" dirty="0">
-                <a:solidFill>
-                  <a:srgbClr val="0070C0"/>
-                </a:solidFill>
-              </a:rPr>
-              <a:t>Back up (almost) everything created by a human or recorded by a machine as soon as it is created</a:t>
-            </a:r>
-            <a:r>
-              <a:rPr lang="en-GB" sz="2800" dirty="0" smtClean="0">
-                <a:solidFill>
-                  <a:srgbClr val="0070C0"/>
-                </a:solidFill>
-              </a:rPr>
-              <a:t>.</a:t>
-            </a:r>
-            <a:endParaRPr lang="pl-PL" sz="2800" dirty="0" smtClean="0">
-              <a:solidFill>
-                <a:srgbClr val="0070C0"/>
-              </a:solidFill>
-            </a:endParaRPr>
-          </a:p>
-          <a:p>
-            <a:pPr marL="457200" indent="-457200">
-              <a:buFont typeface="Arial" panose="020B0604020202020204" pitchFamily="34" charset="0"/>
-              <a:buChar char="•"/>
-            </a:pPr>
-            <a:endParaRPr lang="en-GB" sz="2800" dirty="0">
-              <a:solidFill>
-                <a:srgbClr val="0070C0"/>
-              </a:solidFill>
-            </a:endParaRPr>
-          </a:p>
-          <a:p>
-            <a:pPr marL="457200" indent="-457200">
-              <a:buFont typeface="Arial" panose="020B0604020202020204" pitchFamily="34" charset="0"/>
-              <a:buChar char="•"/>
-            </a:pPr>
-            <a:r>
-              <a:rPr lang="en-GB" sz="2800" dirty="0">
-                <a:solidFill>
-                  <a:srgbClr val="0070C0"/>
-                </a:solidFill>
-              </a:rPr>
-              <a:t>Always backup your files in 3 places, at least one should be off-site</a:t>
-            </a:r>
-            <a:r>
-              <a:rPr lang="en-GB" sz="2800" dirty="0" smtClean="0">
-                <a:solidFill>
-                  <a:srgbClr val="0070C0"/>
-                </a:solidFill>
-              </a:rPr>
-              <a:t>.</a:t>
-            </a:r>
-            <a:endParaRPr lang="pl-PL" sz="2800" dirty="0" smtClean="0">
-              <a:solidFill>
-                <a:srgbClr val="0070C0"/>
-              </a:solidFill>
-            </a:endParaRPr>
-          </a:p>
-          <a:p>
-            <a:pPr marL="457200" indent="-457200">
-              <a:buFont typeface="Arial" panose="020B0604020202020204" pitchFamily="34" charset="0"/>
-              <a:buChar char="•"/>
-            </a:pPr>
-            <a:endParaRPr lang="en-GB" sz="2800" dirty="0">
-              <a:solidFill>
-                <a:srgbClr val="0070C0"/>
-              </a:solidFill>
-            </a:endParaRPr>
-          </a:p>
-          <a:p>
-            <a:pPr marL="457200" indent="-457200">
-              <a:buFont typeface="Arial" panose="020B0604020202020204" pitchFamily="34" charset="0"/>
-              <a:buChar char="•"/>
-            </a:pPr>
-            <a:r>
-              <a:rPr lang="en-GB" sz="2800" dirty="0">
-                <a:solidFill>
-                  <a:srgbClr val="0070C0"/>
-                </a:solidFill>
-              </a:rPr>
-              <a:t>USB sticks are a failure-prone option and are not a valid solution for backup of scientific data</a:t>
-            </a:r>
-          </a:p>
-          <a:p>
-            <a:pPr marL="457200" indent="-457200">
-              <a:buFont typeface="Arial" panose="020B0604020202020204" pitchFamily="34" charset="0"/>
-              <a:buChar char="•"/>
-            </a:pPr>
-            <a:endParaRPr lang="en-GB" sz="2800" dirty="0">
-              <a:solidFill>
-                <a:srgbClr val="0070C0"/>
-              </a:solidFill>
-            </a:endParaRPr>
-          </a:p>
-          <a:p>
-            <a:pPr marL="457200" indent="-457200">
-              <a:buFont typeface="Arial" panose="020B0604020202020204" pitchFamily="34" charset="0"/>
-              <a:buChar char="•"/>
-            </a:pPr>
-            <a:r>
-              <a:rPr lang="en-GB" sz="2800" dirty="0">
-                <a:solidFill>
-                  <a:srgbClr val="0070C0"/>
-                </a:solidFill>
-              </a:rPr>
-              <a:t>A robust backup cannot be achieved manually</a:t>
-            </a:r>
-          </a:p>
-        </p:txBody>
-      </p:sp>
     </p:spTree>
     <p:extLst>
       <p:ext uri="{BB962C8B-B14F-4D97-AF65-F5344CB8AC3E}">
-        <p14:creationId xmlns:p14="http://schemas.microsoft.com/office/powerpoint/2010/main" val="693671975"/>
+        <p14:creationId xmlns:p14="http://schemas.microsoft.com/office/powerpoint/2010/main" val="1908239480"/>
       </p:ext>
     </p:extLst>
   </p:cSld>
@@ -6581,275 +6618,12 @@
           <a:chExt cx="0" cy="0"/>
         </a:xfrm>
       </p:grpSpPr>
-      <p:sp>
-        <p:nvSpPr>
-          <p:cNvPr id="5" name="TextBox 4">
-            <a:extLst>
-              <a:ext uri="{FF2B5EF4-FFF2-40B4-BE49-F238E27FC236}">
-                <a16:creationId xmlns:a16="http://schemas.microsoft.com/office/drawing/2014/main" id="{3A7A1F5C-9C70-4DE3-BA39-7835B2935EB3}"/>
-              </a:ext>
-            </a:extLst>
-          </p:cNvPr>
-          <p:cNvSpPr txBox="1"/>
-          <p:nvPr/>
-        </p:nvSpPr>
-        <p:spPr>
-          <a:xfrm>
-            <a:off x="1363735" y="1129464"/>
-            <a:ext cx="9464530" cy="5262979"/>
-          </a:xfrm>
-          <a:prstGeom prst="rect">
-            <a:avLst/>
-          </a:prstGeom>
-          <a:noFill/>
-        </p:spPr>
-        <p:txBody>
-          <a:bodyPr wrap="square">
-            <a:spAutoFit/>
-          </a:bodyPr>
-          <a:lstStyle/>
-          <a:p>
-            <a:r>
-              <a:rPr lang="pl-PL" sz="2800" dirty="0" smtClean="0">
-                <a:solidFill>
-                  <a:srgbClr val="0070C0"/>
-                </a:solidFill>
-              </a:rPr>
-              <a:t>Plan, plan, revise, update, adhere</a:t>
-            </a:r>
-          </a:p>
-          <a:p>
-            <a:r>
-              <a:rPr lang="en-GB" sz="2800" dirty="0" smtClean="0">
-                <a:solidFill>
-                  <a:srgbClr val="0070C0"/>
-                </a:solidFill>
-              </a:rPr>
-              <a:t> </a:t>
-            </a:r>
-            <a:endParaRPr lang="en-GB" sz="2800" dirty="0">
-              <a:solidFill>
-                <a:srgbClr val="0070C0"/>
-              </a:solidFill>
-            </a:endParaRPr>
-          </a:p>
-          <a:p>
-            <a:pPr marL="457200" indent="-457200">
-              <a:buFont typeface="Arial" panose="020B0604020202020204" pitchFamily="34" charset="0"/>
-              <a:buChar char="•"/>
-            </a:pPr>
-            <a:r>
-              <a:rPr lang="en-GB" sz="2800" dirty="0" smtClean="0">
-                <a:solidFill>
-                  <a:srgbClr val="0070C0"/>
-                </a:solidFill>
-              </a:rPr>
-              <a:t>If </a:t>
-            </a:r>
-            <a:r>
-              <a:rPr lang="en-GB" sz="2800" dirty="0">
-                <a:solidFill>
-                  <a:srgbClr val="0070C0"/>
-                </a:solidFill>
-              </a:rPr>
-              <a:t>you change the strategy document it in PROJECT_STRUCTURE </a:t>
-            </a:r>
-            <a:r>
-              <a:rPr lang="pl-PL" sz="2800" dirty="0" smtClean="0">
-                <a:solidFill>
-                  <a:srgbClr val="0070C0"/>
-                </a:solidFill>
-              </a:rPr>
-              <a:t/>
-            </a:r>
-            <a:br>
-              <a:rPr lang="pl-PL" sz="2800" dirty="0" smtClean="0">
-                <a:solidFill>
-                  <a:srgbClr val="0070C0"/>
-                </a:solidFill>
-              </a:rPr>
-            </a:br>
-            <a:r>
-              <a:rPr lang="pl-PL" sz="2800" dirty="0" smtClean="0">
-                <a:solidFill>
-                  <a:srgbClr val="0070C0"/>
-                </a:solidFill>
-              </a:rPr>
-              <a:t>(</a:t>
-            </a:r>
-            <a:r>
-              <a:rPr lang="en-GB" sz="2800" dirty="0" smtClean="0">
-                <a:solidFill>
-                  <a:srgbClr val="0070C0"/>
-                </a:solidFill>
-              </a:rPr>
-              <a:t>why </a:t>
-            </a:r>
-            <a:r>
-              <a:rPr lang="en-GB" sz="2800" dirty="0">
-                <a:solidFill>
-                  <a:srgbClr val="0070C0"/>
-                </a:solidFill>
-              </a:rPr>
-              <a:t>you made the change and </a:t>
-            </a:r>
-            <a:r>
-              <a:rPr lang="en-GB" sz="2800" dirty="0" smtClean="0">
-                <a:solidFill>
-                  <a:srgbClr val="0070C0"/>
-                </a:solidFill>
-              </a:rPr>
-              <a:t>when</a:t>
-            </a:r>
-            <a:r>
-              <a:rPr lang="pl-PL" sz="2800" dirty="0" smtClean="0">
-                <a:solidFill>
-                  <a:srgbClr val="0070C0"/>
-                </a:solidFill>
-              </a:rPr>
-              <a:t>)</a:t>
-            </a:r>
-            <a:r>
-              <a:rPr lang="en-GB" sz="2800" dirty="0" smtClean="0">
-                <a:solidFill>
-                  <a:srgbClr val="0070C0"/>
-                </a:solidFill>
-              </a:rPr>
-              <a:t> </a:t>
-            </a:r>
-            <a:endParaRPr lang="pl-PL" sz="2800" dirty="0" smtClean="0">
-              <a:solidFill>
-                <a:srgbClr val="0070C0"/>
-              </a:solidFill>
-            </a:endParaRPr>
-          </a:p>
-          <a:p>
-            <a:pPr marL="457200" indent="-457200">
-              <a:buFont typeface="Arial" panose="020B0604020202020204" pitchFamily="34" charset="0"/>
-              <a:buChar char="•"/>
-            </a:pPr>
-            <a:endParaRPr lang="pl-PL" sz="2800" dirty="0">
-              <a:solidFill>
-                <a:srgbClr val="0070C0"/>
-              </a:solidFill>
-            </a:endParaRPr>
-          </a:p>
-          <a:p>
-            <a:pPr marL="457200" indent="-457200">
-              <a:buFont typeface="Arial" panose="020B0604020202020204" pitchFamily="34" charset="0"/>
-              <a:buChar char="•"/>
-            </a:pPr>
-            <a:r>
-              <a:rPr lang="en-GB" sz="2800" dirty="0" smtClean="0">
-                <a:solidFill>
-                  <a:srgbClr val="0070C0"/>
-                </a:solidFill>
-              </a:rPr>
-              <a:t>Update </a:t>
-            </a:r>
-            <a:r>
-              <a:rPr lang="en-GB" sz="2800" dirty="0">
-                <a:solidFill>
-                  <a:srgbClr val="0070C0"/>
-                </a:solidFill>
-              </a:rPr>
-              <a:t>the locations and names of files which followed the old </a:t>
-            </a:r>
-            <a:r>
-              <a:rPr lang="en-GB" sz="2800" dirty="0" smtClean="0">
-                <a:solidFill>
-                  <a:srgbClr val="0070C0"/>
-                </a:solidFill>
-              </a:rPr>
-              <a:t>convention</a:t>
-            </a:r>
-            <a:endParaRPr lang="pl-PL" sz="2800" dirty="0" smtClean="0">
-              <a:solidFill>
-                <a:srgbClr val="0070C0"/>
-              </a:solidFill>
-            </a:endParaRPr>
-          </a:p>
-          <a:p>
-            <a:pPr marL="457200" indent="-457200">
-              <a:buFont typeface="Arial" panose="020B0604020202020204" pitchFamily="34" charset="0"/>
-              <a:buChar char="•"/>
-            </a:pPr>
-            <a:endParaRPr lang="pl-PL" sz="2800" dirty="0">
-              <a:solidFill>
-                <a:srgbClr val="0070C0"/>
-              </a:solidFill>
-            </a:endParaRPr>
-          </a:p>
-          <a:p>
-            <a:pPr marL="457200" indent="-457200">
-              <a:buFont typeface="Arial" panose="020B0604020202020204" pitchFamily="34" charset="0"/>
-              <a:buChar char="•"/>
-            </a:pPr>
-            <a:endParaRPr lang="pl-PL" sz="2800" dirty="0" smtClean="0">
-              <a:solidFill>
-                <a:srgbClr val="0070C0"/>
-              </a:solidFill>
-            </a:endParaRPr>
-          </a:p>
-          <a:p>
-            <a:pPr marL="457200" indent="-457200">
-              <a:buFont typeface="Arial" panose="020B0604020202020204" pitchFamily="34" charset="0"/>
-              <a:buChar char="•"/>
-            </a:pPr>
-            <a:r>
-              <a:rPr lang="en-GB" sz="2800" dirty="0">
-                <a:solidFill>
-                  <a:srgbClr val="0070C0"/>
-                </a:solidFill>
-              </a:rPr>
-              <a:t>Bulk renaming of files can be done with the software such as Ant </a:t>
-            </a:r>
-            <a:r>
-              <a:rPr lang="en-GB" sz="2800" dirty="0" err="1">
-                <a:solidFill>
-                  <a:srgbClr val="0070C0"/>
-                </a:solidFill>
-              </a:rPr>
-              <a:t>Renamer</a:t>
-            </a:r>
-            <a:r>
-              <a:rPr lang="en-GB" sz="2800" dirty="0">
-                <a:solidFill>
-                  <a:srgbClr val="0070C0"/>
-                </a:solidFill>
-              </a:rPr>
-              <a:t>, </a:t>
-            </a:r>
-            <a:r>
-              <a:rPr lang="en-GB" sz="2800" dirty="0" err="1">
-                <a:solidFill>
-                  <a:srgbClr val="0070C0"/>
-                </a:solidFill>
-              </a:rPr>
-              <a:t>RenameIT</a:t>
-            </a:r>
-            <a:r>
-              <a:rPr lang="en-GB" sz="2800" dirty="0">
-                <a:solidFill>
-                  <a:srgbClr val="0070C0"/>
-                </a:solidFill>
-              </a:rPr>
-              <a:t> or Rename4Mac.</a:t>
-            </a:r>
-            <a:endParaRPr lang="en-GB" sz="2800" dirty="0">
-              <a:solidFill>
-                <a:srgbClr val="0070C0"/>
-              </a:solidFill>
-            </a:endParaRPr>
-          </a:p>
-        </p:txBody>
-      </p:sp>
       <p:pic>
         <p:nvPicPr>
-          <p:cNvPr id="4" name="Picture 2" descr="Ed_DaSH">
-            <a:extLst>
-              <a:ext uri="{FF2B5EF4-FFF2-40B4-BE49-F238E27FC236}">
-                <a16:creationId xmlns:a16="http://schemas.microsoft.com/office/drawing/2014/main" id="{A783256F-E39E-4712-96B0-240BD611CFEB}"/>
+          <p:cNvPr id="6" name="Picture 2" descr="Ed_DaSH">
+            <a:extLst>
+              <a:ext uri="{FF2B5EF4-FFF2-40B4-BE49-F238E27FC236}">
+                <a16:creationId xmlns:a16="http://schemas.microsoft.com/office/drawing/2014/main" id="{6F3CF586-06D2-46C3-A4A3-130E31C4A16F}"/>
               </a:ext>
             </a:extLst>
           </p:cNvPr>
@@ -6891,10 +6665,194 @@
           </a:extLst>
         </p:spPr>
       </p:pic>
+      <p:sp>
+        <p:nvSpPr>
+          <p:cNvPr id="4" name="TextBox 3">
+            <a:extLst>
+              <a:ext uri="{FF2B5EF4-FFF2-40B4-BE49-F238E27FC236}">
+                <a16:creationId xmlns:a16="http://schemas.microsoft.com/office/drawing/2014/main" id="{F4B0FDD5-5348-354F-A378-7241F2AF057B}"/>
+              </a:ext>
+            </a:extLst>
+          </p:cNvPr>
+          <p:cNvSpPr txBox="1"/>
+          <p:nvPr/>
+        </p:nvSpPr>
+        <p:spPr>
+          <a:xfrm>
+            <a:off x="488283" y="215448"/>
+            <a:ext cx="9348713" cy="769441"/>
+          </a:xfrm>
+          <a:prstGeom prst="rect">
+            <a:avLst/>
+          </a:prstGeom>
+          <a:noFill/>
+        </p:spPr>
+        <p:txBody>
+          <a:bodyPr wrap="none" rtlCol="0">
+            <a:spAutoFit/>
+          </a:bodyPr>
+          <a:lstStyle/>
+          <a:p>
+            <a:pPr algn="ctr"/>
+            <a:r>
+              <a:rPr lang="en-GB" sz="4400" dirty="0">
+                <a:solidFill>
+                  <a:srgbClr val="0070C0"/>
+                </a:solidFill>
+              </a:rPr>
+              <a:t>Backing up your project files and folders</a:t>
+            </a:r>
+          </a:p>
+        </p:txBody>
+      </p:sp>
+      <p:sp>
+        <p:nvSpPr>
+          <p:cNvPr id="9" name="TextBox 8">
+            <a:extLst>
+              <a:ext uri="{FF2B5EF4-FFF2-40B4-BE49-F238E27FC236}">
+                <a16:creationId xmlns:a16="http://schemas.microsoft.com/office/drawing/2014/main" id="{BAD6A8BB-6E1B-5E43-83C2-4F8F05A73369}"/>
+              </a:ext>
+            </a:extLst>
+          </p:cNvPr>
+          <p:cNvSpPr txBox="1"/>
+          <p:nvPr/>
+        </p:nvSpPr>
+        <p:spPr>
+          <a:xfrm>
+            <a:off x="948099" y="1355649"/>
+            <a:ext cx="10048452" cy="4401205"/>
+          </a:xfrm>
+          <a:prstGeom prst="rect">
+            <a:avLst/>
+          </a:prstGeom>
+          <a:noFill/>
+        </p:spPr>
+        <p:txBody>
+          <a:bodyPr wrap="square">
+            <a:spAutoFit/>
+          </a:bodyPr>
+          <a:lstStyle/>
+          <a:p>
+            <a:pPr marL="457200" indent="-457200">
+              <a:buFont typeface="Arial" panose="020B0604020202020204" pitchFamily="34" charset="0"/>
+              <a:buChar char="•"/>
+            </a:pPr>
+            <a:r>
+              <a:rPr lang="en-GB" sz="2800" dirty="0">
+                <a:solidFill>
+                  <a:srgbClr val="0070C0"/>
+                </a:solidFill>
+              </a:rPr>
+              <a:t>Back up (almost) everything created by a human or recorded by a machine as soon as it is created</a:t>
+            </a:r>
+            <a:r>
+              <a:rPr lang="en-GB" sz="2800" dirty="0" smtClean="0">
+                <a:solidFill>
+                  <a:srgbClr val="0070C0"/>
+                </a:solidFill>
+              </a:rPr>
+              <a:t>.</a:t>
+            </a:r>
+            <a:endParaRPr lang="pl-PL" sz="2800" dirty="0" smtClean="0">
+              <a:solidFill>
+                <a:srgbClr val="0070C0"/>
+              </a:solidFill>
+            </a:endParaRPr>
+          </a:p>
+          <a:p>
+            <a:pPr marL="457200" indent="-457200">
+              <a:buFont typeface="Arial" panose="020B0604020202020204" pitchFamily="34" charset="0"/>
+              <a:buChar char="•"/>
+            </a:pPr>
+            <a:endParaRPr lang="en-GB" sz="2800" dirty="0">
+              <a:solidFill>
+                <a:srgbClr val="0070C0"/>
+              </a:solidFill>
+            </a:endParaRPr>
+          </a:p>
+          <a:p>
+            <a:pPr marL="457200" indent="-457200">
+              <a:buFont typeface="Arial" panose="020B0604020202020204" pitchFamily="34" charset="0"/>
+              <a:buChar char="•"/>
+            </a:pPr>
+            <a:r>
+              <a:rPr lang="en-GB" sz="2800" dirty="0">
+                <a:solidFill>
+                  <a:srgbClr val="0070C0"/>
+                </a:solidFill>
+              </a:rPr>
+              <a:t>Always backup your files in 3 places, at least one should be off-site</a:t>
+            </a:r>
+            <a:r>
+              <a:rPr lang="en-GB" sz="2800" dirty="0" smtClean="0">
+                <a:solidFill>
+                  <a:srgbClr val="0070C0"/>
+                </a:solidFill>
+              </a:rPr>
+              <a:t>.</a:t>
+            </a:r>
+            <a:endParaRPr lang="pl-PL" sz="2800" dirty="0" smtClean="0">
+              <a:solidFill>
+                <a:srgbClr val="0070C0"/>
+              </a:solidFill>
+            </a:endParaRPr>
+          </a:p>
+          <a:p>
+            <a:pPr marL="457200" indent="-457200">
+              <a:buFont typeface="Arial" panose="020B0604020202020204" pitchFamily="34" charset="0"/>
+              <a:buChar char="•"/>
+            </a:pPr>
+            <a:endParaRPr lang="en-GB" sz="2800" dirty="0">
+              <a:solidFill>
+                <a:srgbClr val="0070C0"/>
+              </a:solidFill>
+            </a:endParaRPr>
+          </a:p>
+          <a:p>
+            <a:pPr marL="457200" indent="-457200">
+              <a:buFont typeface="Arial" panose="020B0604020202020204" pitchFamily="34" charset="0"/>
+              <a:buChar char="•"/>
+            </a:pPr>
+            <a:r>
+              <a:rPr lang="en-GB" sz="2800" dirty="0">
+                <a:solidFill>
+                  <a:srgbClr val="0070C0"/>
+                </a:solidFill>
+              </a:rPr>
+              <a:t>USB sticks are a failure-prone option and are not a valid solution for backup of scientific data</a:t>
+            </a:r>
+          </a:p>
+          <a:p>
+            <a:pPr marL="457200" indent="-457200">
+              <a:buFont typeface="Arial" panose="020B0604020202020204" pitchFamily="34" charset="0"/>
+              <a:buChar char="•"/>
+            </a:pPr>
+            <a:endParaRPr lang="en-GB" sz="2800" dirty="0">
+              <a:solidFill>
+                <a:srgbClr val="0070C0"/>
+              </a:solidFill>
+            </a:endParaRPr>
+          </a:p>
+          <a:p>
+            <a:pPr marL="457200" indent="-457200">
+              <a:buFont typeface="Arial" panose="020B0604020202020204" pitchFamily="34" charset="0"/>
+              <a:buChar char="•"/>
+            </a:pPr>
+            <a:r>
+              <a:rPr lang="en-GB" sz="2800" dirty="0">
+                <a:solidFill>
+                  <a:srgbClr val="0070C0"/>
+                </a:solidFill>
+              </a:rPr>
+              <a:t>A robust backup cannot be achieved manually</a:t>
+            </a:r>
+          </a:p>
+        </p:txBody>
+      </p:sp>
     </p:spTree>
     <p:extLst>
       <p:ext uri="{BB962C8B-B14F-4D97-AF65-F5344CB8AC3E}">
-        <p14:creationId xmlns:p14="http://schemas.microsoft.com/office/powerpoint/2010/main" val="2278557793"/>
+        <p14:creationId xmlns:p14="http://schemas.microsoft.com/office/powerpoint/2010/main" val="693671975"/>
       </p:ext>
     </p:extLst>
   </p:cSld>
@@ -6921,6 +6879,264 @@
           <a:chExt cx="0" cy="0"/>
         </a:xfrm>
       </p:grpSpPr>
+      <p:sp>
+        <p:nvSpPr>
+          <p:cNvPr id="5" name="TextBox 4">
+            <a:extLst>
+              <a:ext uri="{FF2B5EF4-FFF2-40B4-BE49-F238E27FC236}">
+                <a16:creationId xmlns:a16="http://schemas.microsoft.com/office/drawing/2014/main" id="{3A7A1F5C-9C70-4DE3-BA39-7835B2935EB3}"/>
+              </a:ext>
+            </a:extLst>
+          </p:cNvPr>
+          <p:cNvSpPr txBox="1"/>
+          <p:nvPr/>
+        </p:nvSpPr>
+        <p:spPr>
+          <a:xfrm>
+            <a:off x="1363735" y="1129464"/>
+            <a:ext cx="9464530" cy="5262979"/>
+          </a:xfrm>
+          <a:prstGeom prst="rect">
+            <a:avLst/>
+          </a:prstGeom>
+          <a:noFill/>
+        </p:spPr>
+        <p:txBody>
+          <a:bodyPr wrap="square">
+            <a:spAutoFit/>
+          </a:bodyPr>
+          <a:lstStyle/>
+          <a:p>
+            <a:r>
+              <a:rPr lang="pl-PL" sz="2800" dirty="0" smtClean="0">
+                <a:solidFill>
+                  <a:srgbClr val="0070C0"/>
+                </a:solidFill>
+              </a:rPr>
+              <a:t>Plan, plan, revise, update, adhere</a:t>
+            </a:r>
+          </a:p>
+          <a:p>
+            <a:r>
+              <a:rPr lang="en-GB" sz="2800" dirty="0" smtClean="0">
+                <a:solidFill>
+                  <a:srgbClr val="0070C0"/>
+                </a:solidFill>
+              </a:rPr>
+              <a:t> </a:t>
+            </a:r>
+            <a:endParaRPr lang="en-GB" sz="2800" dirty="0">
+              <a:solidFill>
+                <a:srgbClr val="0070C0"/>
+              </a:solidFill>
+            </a:endParaRPr>
+          </a:p>
+          <a:p>
+            <a:pPr marL="457200" indent="-457200">
+              <a:buFont typeface="Arial" panose="020B0604020202020204" pitchFamily="34" charset="0"/>
+              <a:buChar char="•"/>
+            </a:pPr>
+            <a:r>
+              <a:rPr lang="en-GB" sz="2800" dirty="0" smtClean="0">
+                <a:solidFill>
+                  <a:srgbClr val="0070C0"/>
+                </a:solidFill>
+              </a:rPr>
+              <a:t>If </a:t>
+            </a:r>
+            <a:r>
+              <a:rPr lang="en-GB" sz="2800" dirty="0">
+                <a:solidFill>
+                  <a:srgbClr val="0070C0"/>
+                </a:solidFill>
+              </a:rPr>
+              <a:t>you change the strategy document it in PROJECT_STRUCTURE </a:t>
+            </a:r>
+            <a:r>
+              <a:rPr lang="pl-PL" sz="2800" dirty="0" smtClean="0">
+                <a:solidFill>
+                  <a:srgbClr val="0070C0"/>
+                </a:solidFill>
+              </a:rPr>
+              <a:t/>
+            </a:r>
+            <a:br>
+              <a:rPr lang="pl-PL" sz="2800" dirty="0" smtClean="0">
+                <a:solidFill>
+                  <a:srgbClr val="0070C0"/>
+                </a:solidFill>
+              </a:rPr>
+            </a:br>
+            <a:r>
+              <a:rPr lang="pl-PL" sz="2800" dirty="0" smtClean="0">
+                <a:solidFill>
+                  <a:srgbClr val="0070C0"/>
+                </a:solidFill>
+              </a:rPr>
+              <a:t>(</a:t>
+            </a:r>
+            <a:r>
+              <a:rPr lang="en-GB" sz="2800" dirty="0" smtClean="0">
+                <a:solidFill>
+                  <a:srgbClr val="0070C0"/>
+                </a:solidFill>
+              </a:rPr>
+              <a:t>why </a:t>
+            </a:r>
+            <a:r>
+              <a:rPr lang="en-GB" sz="2800" dirty="0">
+                <a:solidFill>
+                  <a:srgbClr val="0070C0"/>
+                </a:solidFill>
+              </a:rPr>
+              <a:t>you made the change and </a:t>
+            </a:r>
+            <a:r>
+              <a:rPr lang="en-GB" sz="2800" dirty="0" smtClean="0">
+                <a:solidFill>
+                  <a:srgbClr val="0070C0"/>
+                </a:solidFill>
+              </a:rPr>
+              <a:t>when</a:t>
+            </a:r>
+            <a:r>
+              <a:rPr lang="pl-PL" sz="2800" dirty="0" smtClean="0">
+                <a:solidFill>
+                  <a:srgbClr val="0070C0"/>
+                </a:solidFill>
+              </a:rPr>
+              <a:t>)</a:t>
+            </a:r>
+            <a:r>
+              <a:rPr lang="en-GB" sz="2800" dirty="0" smtClean="0">
+                <a:solidFill>
+                  <a:srgbClr val="0070C0"/>
+                </a:solidFill>
+              </a:rPr>
+              <a:t> </a:t>
+            </a:r>
+            <a:endParaRPr lang="pl-PL" sz="2800" dirty="0" smtClean="0">
+              <a:solidFill>
+                <a:srgbClr val="0070C0"/>
+              </a:solidFill>
+            </a:endParaRPr>
+          </a:p>
+          <a:p>
+            <a:pPr marL="457200" indent="-457200">
+              <a:buFont typeface="Arial" panose="020B0604020202020204" pitchFamily="34" charset="0"/>
+              <a:buChar char="•"/>
+            </a:pPr>
+            <a:endParaRPr lang="pl-PL" sz="2800" dirty="0">
+              <a:solidFill>
+                <a:srgbClr val="0070C0"/>
+              </a:solidFill>
+            </a:endParaRPr>
+          </a:p>
+          <a:p>
+            <a:pPr marL="457200" indent="-457200">
+              <a:buFont typeface="Arial" panose="020B0604020202020204" pitchFamily="34" charset="0"/>
+              <a:buChar char="•"/>
+            </a:pPr>
+            <a:r>
+              <a:rPr lang="en-GB" sz="2800" dirty="0" smtClean="0">
+                <a:solidFill>
+                  <a:srgbClr val="0070C0"/>
+                </a:solidFill>
+              </a:rPr>
+              <a:t>Update </a:t>
+            </a:r>
+            <a:r>
+              <a:rPr lang="en-GB" sz="2800" dirty="0">
+                <a:solidFill>
+                  <a:srgbClr val="0070C0"/>
+                </a:solidFill>
+              </a:rPr>
+              <a:t>the locations and names of files which followed the old </a:t>
+            </a:r>
+            <a:r>
+              <a:rPr lang="en-GB" sz="2800" dirty="0" smtClean="0">
+                <a:solidFill>
+                  <a:srgbClr val="0070C0"/>
+                </a:solidFill>
+              </a:rPr>
+              <a:t>convention</a:t>
+            </a:r>
+            <a:endParaRPr lang="pl-PL" sz="2800" dirty="0" smtClean="0">
+              <a:solidFill>
+                <a:srgbClr val="0070C0"/>
+              </a:solidFill>
+            </a:endParaRPr>
+          </a:p>
+          <a:p>
+            <a:pPr marL="457200" indent="-457200">
+              <a:buFont typeface="Arial" panose="020B0604020202020204" pitchFamily="34" charset="0"/>
+              <a:buChar char="•"/>
+            </a:pPr>
+            <a:endParaRPr lang="pl-PL" sz="2800" dirty="0">
+              <a:solidFill>
+                <a:srgbClr val="0070C0"/>
+              </a:solidFill>
+            </a:endParaRPr>
+          </a:p>
+          <a:p>
+            <a:pPr marL="457200" indent="-457200">
+              <a:buFont typeface="Arial" panose="020B0604020202020204" pitchFamily="34" charset="0"/>
+              <a:buChar char="•"/>
+            </a:pPr>
+            <a:endParaRPr lang="pl-PL" sz="2800" dirty="0" smtClean="0">
+              <a:solidFill>
+                <a:srgbClr val="0070C0"/>
+              </a:solidFill>
+            </a:endParaRPr>
+          </a:p>
+          <a:p>
+            <a:pPr marL="457200" indent="-457200">
+              <a:buFont typeface="Arial" panose="020B0604020202020204" pitchFamily="34" charset="0"/>
+              <a:buChar char="•"/>
+            </a:pPr>
+            <a:r>
+              <a:rPr lang="en-GB" sz="2800" dirty="0">
+                <a:solidFill>
+                  <a:srgbClr val="0070C0"/>
+                </a:solidFill>
+              </a:rPr>
+              <a:t>Bulk renaming of files can be done with the software such as Ant </a:t>
+            </a:r>
+            <a:r>
+              <a:rPr lang="en-GB" sz="2800" dirty="0" err="1">
+                <a:solidFill>
+                  <a:srgbClr val="0070C0"/>
+                </a:solidFill>
+              </a:rPr>
+              <a:t>Renamer</a:t>
+            </a:r>
+            <a:r>
+              <a:rPr lang="en-GB" sz="2800" dirty="0">
+                <a:solidFill>
+                  <a:srgbClr val="0070C0"/>
+                </a:solidFill>
+              </a:rPr>
+              <a:t>, </a:t>
+            </a:r>
+            <a:r>
+              <a:rPr lang="en-GB" sz="2800" dirty="0" err="1">
+                <a:solidFill>
+                  <a:srgbClr val="0070C0"/>
+                </a:solidFill>
+              </a:rPr>
+              <a:t>RenameIT</a:t>
+            </a:r>
+            <a:r>
+              <a:rPr lang="en-GB" sz="2800" dirty="0">
+                <a:solidFill>
+                  <a:srgbClr val="0070C0"/>
+                </a:solidFill>
+              </a:rPr>
+              <a:t> or Rename4Mac.</a:t>
+            </a:r>
+          </a:p>
+        </p:txBody>
+      </p:sp>
       <p:pic>
         <p:nvPicPr>
           <p:cNvPr id="4" name="Picture 2" descr="Ed_DaSH">
@@ -6971,7 +7187,7 @@
     </p:spTree>
     <p:extLst>
       <p:ext uri="{BB962C8B-B14F-4D97-AF65-F5344CB8AC3E}">
-        <p14:creationId xmlns:p14="http://schemas.microsoft.com/office/powerpoint/2010/main" val="1344113615"/>
+        <p14:creationId xmlns:p14="http://schemas.microsoft.com/office/powerpoint/2010/main" val="2278557793"/>
       </p:ext>
     </p:extLst>
   </p:cSld>
@@ -7061,6 +7277,83 @@
     <p:extLst>
       <p:ext uri="{BB962C8B-B14F-4D97-AF65-F5344CB8AC3E}">
         <p14:creationId xmlns:p14="http://schemas.microsoft.com/office/powerpoint/2010/main" val="3747721469"/>
+      </p:ext>
+    </p:extLst>
+  </p:cSld>
+  <p:clrMapOvr>
+    <a:masterClrMapping/>
+  </p:clrMapOvr>
+</p:sld>
+</file>
+
+<file path=ppt/slides/slide24.xml><?xml version="1.0" encoding="utf-8"?>
+<p:sld xmlns:a="http://schemas.openxmlformats.org/drawingml/2006/main" xmlns:r="http://schemas.openxmlformats.org/officeDocument/2006/relationships" xmlns:p="http://schemas.openxmlformats.org/presentationml/2006/main">
+  <p:cSld>
+    <p:spTree>
+      <p:nvGrpSpPr>
+        <p:cNvPr id="1" name=""/>
+        <p:cNvGrpSpPr/>
+        <p:nvPr/>
+      </p:nvGrpSpPr>
+      <p:grpSpPr>
+        <a:xfrm>
+          <a:off x="0" y="0"/>
+          <a:ext cx="0" cy="0"/>
+          <a:chOff x="0" y="0"/>
+          <a:chExt cx="0" cy="0"/>
+        </a:xfrm>
+      </p:grpSpPr>
+      <p:pic>
+        <p:nvPicPr>
+          <p:cNvPr id="4" name="Picture 2" descr="Ed_DaSH">
+            <a:extLst>
+              <a:ext uri="{FF2B5EF4-FFF2-40B4-BE49-F238E27FC236}">
+                <a16:creationId xmlns:a16="http://schemas.microsoft.com/office/drawing/2014/main" id="{A783256F-E39E-4712-96B0-240BD611CFEB}"/>
+              </a:ext>
+            </a:extLst>
+          </p:cNvPr>
+          <p:cNvPicPr>
+            <a:picLocks noChangeAspect="1" noChangeArrowheads="1"/>
+          </p:cNvPicPr>
+          <p:nvPr/>
+        </p:nvPicPr>
+        <p:blipFill>
+          <a:blip r:embed="rId2" cstate="hqprint">
+            <a:extLst>
+              <a:ext uri="{28A0092B-C50C-407E-A947-70E740481C1C}">
+                <a14:useLocalDpi xmlns:a14="http://schemas.microsoft.com/office/drawing/2010/main" val="0"/>
+              </a:ext>
+            </a:extLst>
+          </a:blip>
+          <a:srcRect/>
+          <a:stretch>
+            <a:fillRect/>
+          </a:stretch>
+        </p:blipFill>
+        <p:spPr bwMode="auto">
+          <a:xfrm>
+            <a:off x="10820670" y="5458691"/>
+            <a:ext cx="1289214" cy="1325418"/>
+          </a:xfrm>
+          <a:prstGeom prst="rect">
+            <a:avLst/>
+          </a:prstGeom>
+          <a:noFill/>
+          <a:extLst>
+            <a:ext uri="{909E8E84-426E-40DD-AFC4-6F175D3DCCD1}">
+              <a14:hiddenFill xmlns:a14="http://schemas.microsoft.com/office/drawing/2010/main">
+                <a:solidFill>
+                  <a:srgbClr val="FFFFFF"/>
+                </a:solidFill>
+              </a14:hiddenFill>
+            </a:ext>
+          </a:extLst>
+        </p:spPr>
+      </p:pic>
+    </p:spTree>
+    <p:extLst>
+      <p:ext uri="{BB962C8B-B14F-4D97-AF65-F5344CB8AC3E}">
+        <p14:creationId xmlns:p14="http://schemas.microsoft.com/office/powerpoint/2010/main" val="1344113615"/>
       </p:ext>
     </p:extLst>
   </p:cSld>
@@ -7494,11 +7787,6 @@
               </a:rPr>
               <a:t>easily identify if something is missing</a:t>
             </a:r>
-            <a:endParaRPr lang="en-GB" sz="2800" dirty="0">
-              <a:solidFill>
-                <a:srgbClr val="0070C0"/>
-              </a:solidFill>
-            </a:endParaRPr>
           </a:p>
         </p:txBody>
       </p:sp>
@@ -7594,7 +7882,7 @@
         <p:spPr>
           <a:xfrm>
             <a:off x="1363735" y="1129464"/>
-            <a:ext cx="9464530" cy="1384995"/>
+            <a:ext cx="9464530" cy="4832092"/>
           </a:xfrm>
           <a:prstGeom prst="rect">
             <a:avLst/>
@@ -7608,13 +7896,18 @@
           <a:lstStyle/>
           <a:p>
             <a:r>
-              <a:rPr lang="en-GB" sz="2800" dirty="0">
-                <a:solidFill>
-                  <a:srgbClr val="0070C0"/>
-                </a:solidFill>
-              </a:rPr>
-              <a:t>Exercise 1: </a:t>
-            </a:r>
+              <a:rPr lang="pl-PL" sz="2800" dirty="0" smtClean="0">
+                <a:solidFill>
+                  <a:srgbClr val="0070C0"/>
+                </a:solidFill>
+              </a:rPr>
+              <a:t>Example</a:t>
+            </a:r>
+            <a:endParaRPr lang="en-GB" sz="2800" dirty="0">
+              <a:solidFill>
+                <a:srgbClr val="0070C0"/>
+              </a:solidFill>
+            </a:endParaRPr>
           </a:p>
           <a:p>
             <a:pPr algn="ctr"/>
@@ -7625,14 +7918,256 @@
             </a:endParaRPr>
           </a:p>
           <a:p>
-            <a:pPr algn="ctr"/>
+            <a:r>
+              <a:rPr lang="pl-PL" sz="2800" dirty="0" smtClean="0">
+                <a:solidFill>
+                  <a:srgbClr val="0070C0"/>
+                </a:solidFill>
+              </a:rPr>
+              <a:t>	</a:t>
+            </a:r>
+            <a:r>
+              <a:rPr lang="en-GB" sz="2800" dirty="0" smtClean="0">
+                <a:solidFill>
+                  <a:srgbClr val="0070C0"/>
+                </a:solidFill>
+                <a:latin typeface="Courier New" panose="02070309020205020404" pitchFamily="49" charset="0"/>
+                <a:cs typeface="Courier New" panose="02070309020205020404" pitchFamily="49" charset="0"/>
+              </a:rPr>
+              <a:t>LD_phyA_off_t04_2020-08-12.norm.xlsx</a:t>
+            </a:r>
+            <a:endParaRPr lang="en-GB" sz="2800" dirty="0">
+              <a:solidFill>
+                <a:srgbClr val="0070C0"/>
+              </a:solidFill>
+              <a:latin typeface="Courier New" panose="02070309020205020404" pitchFamily="49" charset="0"/>
+              <a:cs typeface="Courier New" panose="02070309020205020404" pitchFamily="49" charset="0"/>
+            </a:endParaRPr>
+          </a:p>
+          <a:p>
+            <a:endParaRPr lang="en-GB" sz="2800" dirty="0">
+              <a:solidFill>
+                <a:srgbClr val="0070C0"/>
+              </a:solidFill>
+            </a:endParaRPr>
+          </a:p>
+          <a:p>
+            <a:r>
+              <a:rPr lang="pl-PL" sz="2800" dirty="0" smtClean="0">
+                <a:solidFill>
+                  <a:srgbClr val="0070C0"/>
+                </a:solidFill>
+              </a:rPr>
+              <a:t>could be a</a:t>
+            </a:r>
+            <a:r>
+              <a:rPr lang="en-GB" sz="2800" dirty="0" smtClean="0">
+                <a:solidFill>
+                  <a:srgbClr val="0070C0"/>
+                </a:solidFill>
+              </a:rPr>
+              <a:t> </a:t>
+            </a:r>
             <a:r>
               <a:rPr lang="en-GB" sz="2800" dirty="0">
                 <a:solidFill>
                   <a:srgbClr val="0070C0"/>
                 </a:solidFill>
               </a:rPr>
-              <a:t>Naming and sorting </a:t>
+              <a:t>file that </a:t>
+            </a:r>
+            <a:r>
+              <a:rPr lang="en-GB" sz="2800" dirty="0" smtClean="0">
+                <a:solidFill>
+                  <a:srgbClr val="0070C0"/>
+                </a:solidFill>
+              </a:rPr>
+              <a:t>contains</a:t>
+            </a:r>
+            <a:r>
+              <a:rPr lang="pl-PL" sz="2800" dirty="0" smtClean="0">
+                <a:solidFill>
+                  <a:srgbClr val="0070C0"/>
+                </a:solidFill>
+              </a:rPr>
+              <a:t>:</a:t>
+            </a:r>
+          </a:p>
+          <a:p>
+            <a:pPr marL="457200" indent="-457200">
+              <a:buFont typeface="Arial" panose="020B0604020202020204" pitchFamily="34" charset="0"/>
+              <a:buChar char="•"/>
+            </a:pPr>
+            <a:r>
+              <a:rPr lang="en-GB" sz="2800" dirty="0" smtClean="0">
+                <a:solidFill>
+                  <a:srgbClr val="0070C0"/>
+                </a:solidFill>
+              </a:rPr>
+              <a:t>normalized </a:t>
+            </a:r>
+            <a:r>
+              <a:rPr lang="en-GB" sz="2800" dirty="0">
+                <a:solidFill>
+                  <a:srgbClr val="0070C0"/>
+                </a:solidFill>
+              </a:rPr>
+              <a:t>data (norm), </a:t>
+            </a:r>
+            <a:endParaRPr lang="pl-PL" sz="2800" dirty="0" smtClean="0">
+              <a:solidFill>
+                <a:srgbClr val="0070C0"/>
+              </a:solidFill>
+            </a:endParaRPr>
+          </a:p>
+          <a:p>
+            <a:pPr marL="457200" indent="-457200">
+              <a:buFont typeface="Arial" panose="020B0604020202020204" pitchFamily="34" charset="0"/>
+              <a:buChar char="•"/>
+            </a:pPr>
+            <a:r>
+              <a:rPr lang="en-GB" sz="2800" dirty="0" smtClean="0">
+                <a:solidFill>
+                  <a:srgbClr val="0070C0"/>
+                </a:solidFill>
+              </a:rPr>
+              <a:t>from </a:t>
+            </a:r>
+            <a:r>
+              <a:rPr lang="en-GB" sz="2800" dirty="0">
+                <a:solidFill>
+                  <a:srgbClr val="0070C0"/>
+                </a:solidFill>
+              </a:rPr>
+              <a:t>experiment in long day (LD) </a:t>
+            </a:r>
+            <a:endParaRPr lang="pl-PL" sz="2800" dirty="0" smtClean="0">
+              <a:solidFill>
+                <a:srgbClr val="0070C0"/>
+              </a:solidFill>
+            </a:endParaRPr>
+          </a:p>
+          <a:p>
+            <a:pPr marL="457200" indent="-457200">
+              <a:buFont typeface="Arial" panose="020B0604020202020204" pitchFamily="34" charset="0"/>
+              <a:buChar char="•"/>
+            </a:pPr>
+            <a:r>
+              <a:rPr lang="en-GB" sz="2800" dirty="0" smtClean="0">
+                <a:solidFill>
+                  <a:srgbClr val="0070C0"/>
+                </a:solidFill>
+              </a:rPr>
+              <a:t>for genotype</a:t>
+            </a:r>
+            <a:r>
+              <a:rPr lang="pl-PL" sz="2800" dirty="0" smtClean="0">
+                <a:solidFill>
+                  <a:srgbClr val="0070C0"/>
+                </a:solidFill>
+              </a:rPr>
+              <a:t> </a:t>
+            </a:r>
+            <a:r>
+              <a:rPr lang="en-GB" sz="2800" dirty="0" err="1" smtClean="0">
+                <a:solidFill>
+                  <a:srgbClr val="0070C0"/>
+                </a:solidFill>
+              </a:rPr>
+              <a:t>phyA</a:t>
+            </a:r>
+            <a:endParaRPr lang="pl-PL" sz="2800" dirty="0" smtClean="0">
+              <a:solidFill>
+                <a:srgbClr val="0070C0"/>
+              </a:solidFill>
+            </a:endParaRPr>
+          </a:p>
+          <a:p>
+            <a:pPr marL="457200" indent="-457200">
+              <a:buFont typeface="Arial" panose="020B0604020202020204" pitchFamily="34" charset="0"/>
+              <a:buChar char="•"/>
+            </a:pPr>
+            <a:r>
+              <a:rPr lang="en-GB" sz="2800" dirty="0" smtClean="0">
+                <a:solidFill>
+                  <a:srgbClr val="0070C0"/>
+                </a:solidFill>
+              </a:rPr>
+              <a:t>with </a:t>
+            </a:r>
+            <a:r>
+              <a:rPr lang="en-GB" sz="2800" dirty="0">
+                <a:solidFill>
+                  <a:srgbClr val="0070C0"/>
+                </a:solidFill>
+              </a:rPr>
+              <a:t>media </a:t>
+            </a:r>
+            <a:r>
+              <a:rPr lang="pl-PL" sz="2800" dirty="0" smtClean="0">
+                <a:solidFill>
+                  <a:srgbClr val="0070C0"/>
+                </a:solidFill>
+              </a:rPr>
+              <a:t>without </a:t>
+            </a:r>
+            <a:r>
+              <a:rPr lang="en-GB" sz="2800" dirty="0" smtClean="0">
+                <a:solidFill>
+                  <a:srgbClr val="0070C0"/>
+                </a:solidFill>
+              </a:rPr>
+              <a:t>sucrose </a:t>
+            </a:r>
+            <a:r>
+              <a:rPr lang="en-GB" sz="2800" dirty="0">
+                <a:solidFill>
+                  <a:srgbClr val="0070C0"/>
+                </a:solidFill>
+              </a:rPr>
+              <a:t>(off</a:t>
+            </a:r>
+            <a:r>
+              <a:rPr lang="en-GB" sz="2800" dirty="0" smtClean="0">
+                <a:solidFill>
+                  <a:srgbClr val="0070C0"/>
+                </a:solidFill>
+              </a:rPr>
+              <a:t>)</a:t>
+            </a:r>
+            <a:endParaRPr lang="pl-PL" sz="2800" dirty="0" smtClean="0">
+              <a:solidFill>
+                <a:srgbClr val="0070C0"/>
+              </a:solidFill>
+            </a:endParaRPr>
+          </a:p>
+          <a:p>
+            <a:pPr marL="457200" indent="-457200">
+              <a:buFont typeface="Arial" panose="020B0604020202020204" pitchFamily="34" charset="0"/>
+              <a:buChar char="•"/>
+            </a:pPr>
+            <a:r>
+              <a:rPr lang="pl-PL" sz="2800" dirty="0" smtClean="0">
+                <a:solidFill>
+                  <a:srgbClr val="0070C0"/>
+                </a:solidFill>
+              </a:rPr>
+              <a:t>at timepoint 4 (t04)</a:t>
+            </a:r>
+            <a:endParaRPr lang="en-GB" sz="2800" dirty="0">
+              <a:solidFill>
+                <a:srgbClr val="0070C0"/>
+              </a:solidFill>
+            </a:endParaRPr>
+          </a:p>
+          <a:p>
+            <a:r>
+              <a:rPr lang="en-GB" sz="2800" dirty="0">
+                <a:solidFill>
+                  <a:srgbClr val="0070C0"/>
+                </a:solidFill>
+              </a:rPr>
+              <a:t> </a:t>
             </a:r>
           </a:p>
         </p:txBody>
@@ -7687,7 +8222,7 @@
     </p:spTree>
     <p:extLst>
       <p:ext uri="{BB962C8B-B14F-4D97-AF65-F5344CB8AC3E}">
-        <p14:creationId xmlns:p14="http://schemas.microsoft.com/office/powerpoint/2010/main" val="2280054951"/>
+        <p14:creationId xmlns:p14="http://schemas.microsoft.com/office/powerpoint/2010/main" val="4253789815"/>
       </p:ext>
     </p:extLst>
   </p:cSld>
@@ -7728,8 +8263,8 @@
         </p:nvSpPr>
         <p:spPr>
           <a:xfrm>
-            <a:off x="847780" y="1379400"/>
-            <a:ext cx="9751569" cy="5016758"/>
+            <a:off x="1363735" y="1129464"/>
+            <a:ext cx="9464530" cy="1384995"/>
           </a:xfrm>
           <a:prstGeom prst="rect">
             <a:avLst/>
@@ -7742,158 +8277,17 @@
           </a:bodyPr>
           <a:lstStyle/>
           <a:p>
-            <a:pPr algn="just"/>
-            <a:r>
-              <a:rPr lang="en-GB" sz="2800" u="sng" dirty="0">
-                <a:solidFill>
-                  <a:srgbClr val="0070C0"/>
-                </a:solidFill>
-              </a:rPr>
-              <a:t>Do’s</a:t>
-            </a:r>
-            <a:r>
-              <a:rPr lang="en-GB" sz="2800" u="sng" dirty="0" smtClean="0">
-                <a:solidFill>
-                  <a:srgbClr val="0070C0"/>
-                </a:solidFill>
-              </a:rPr>
-              <a:t>:</a:t>
-            </a:r>
-            <a:endParaRPr lang="pl-PL" sz="2800" u="sng" dirty="0" smtClean="0">
-              <a:solidFill>
-                <a:srgbClr val="0070C0"/>
-              </a:solidFill>
-            </a:endParaRPr>
-          </a:p>
-          <a:p>
-            <a:pPr algn="just"/>
-            <a:endParaRPr lang="en-GB" sz="2800" u="sng" dirty="0">
-              <a:solidFill>
-                <a:srgbClr val="0070C0"/>
-              </a:solidFill>
-            </a:endParaRPr>
-          </a:p>
-          <a:p>
-            <a:pPr marL="457200" indent="-457200">
-              <a:buFont typeface="Arial" panose="020B0604020202020204" pitchFamily="34" charset="0"/>
-              <a:buChar char="•"/>
-            </a:pPr>
-            <a:r>
-              <a:rPr lang="pl-PL" sz="2800" dirty="0" smtClean="0">
-                <a:solidFill>
-                  <a:srgbClr val="0070C0"/>
-                </a:solidFill>
-              </a:rPr>
-              <a:t>Include date in the name.</a:t>
-            </a:r>
-            <a:br>
-              <a:rPr lang="pl-PL" sz="2800" dirty="0" smtClean="0">
-                <a:solidFill>
-                  <a:srgbClr val="0070C0"/>
-                </a:solidFill>
-              </a:rPr>
-            </a:br>
-            <a:r>
-              <a:rPr lang="pl-PL" sz="2800" dirty="0" smtClean="0">
-                <a:solidFill>
-                  <a:srgbClr val="0070C0"/>
-                </a:solidFill>
-              </a:rPr>
-              <a:t/>
-            </a:r>
-            <a:br>
-              <a:rPr lang="pl-PL" sz="2800" dirty="0" smtClean="0">
-                <a:solidFill>
-                  <a:srgbClr val="0070C0"/>
-                </a:solidFill>
-              </a:rPr>
-            </a:br>
-            <a:r>
-              <a:rPr lang="en-GB" sz="2400" dirty="0" smtClean="0">
-                <a:solidFill>
-                  <a:srgbClr val="0070C0"/>
-                </a:solidFill>
-              </a:rPr>
-              <a:t>Use YYYY-MM-DD</a:t>
-            </a:r>
-            <a:r>
-              <a:rPr lang="pl-PL" sz="2400" dirty="0" smtClean="0">
-                <a:solidFill>
-                  <a:srgbClr val="0070C0"/>
-                </a:solidFill>
-              </a:rPr>
-              <a:t> or YYYMMDD format, eg. 20210920</a:t>
-            </a:r>
-            <a:r>
-              <a:rPr lang="pl-PL" sz="2400" dirty="0">
-                <a:solidFill>
-                  <a:srgbClr val="0070C0"/>
-                </a:solidFill>
-              </a:rPr>
-              <a:t/>
-            </a:r>
-            <a:br>
-              <a:rPr lang="pl-PL" sz="2400" dirty="0">
-                <a:solidFill>
-                  <a:srgbClr val="0070C0"/>
-                </a:solidFill>
-              </a:rPr>
-            </a:br>
-            <a:r>
-              <a:rPr lang="pl-PL" sz="2400" dirty="0" smtClean="0">
-                <a:solidFill>
-                  <a:srgbClr val="0070C0"/>
-                </a:solidFill>
-              </a:rPr>
-              <a:t/>
-            </a:r>
-            <a:br>
-              <a:rPr lang="pl-PL" sz="2400" dirty="0" smtClean="0">
-                <a:solidFill>
-                  <a:srgbClr val="0070C0"/>
-                </a:solidFill>
-              </a:rPr>
-            </a:br>
-            <a:r>
-              <a:rPr lang="pl-PL" sz="2400" dirty="0" smtClean="0">
-                <a:solidFill>
-                  <a:srgbClr val="0070C0"/>
-                </a:solidFill>
-              </a:rPr>
-              <a:t>Add date at</a:t>
-            </a:r>
-            <a:r>
-              <a:rPr lang="en-GB" sz="2400" dirty="0" smtClean="0">
-                <a:solidFill>
-                  <a:srgbClr val="0070C0"/>
-                </a:solidFill>
-              </a:rPr>
-              <a:t> </a:t>
-            </a:r>
-            <a:r>
-              <a:rPr lang="en-GB" sz="2400" dirty="0">
-                <a:solidFill>
-                  <a:srgbClr val="0070C0"/>
-                </a:solidFill>
-              </a:rPr>
-              <a:t>the end of the file UNLESS you </a:t>
-            </a:r>
-            <a:r>
-              <a:rPr lang="en-GB" sz="2400" dirty="0" smtClean="0">
-                <a:solidFill>
-                  <a:srgbClr val="0070C0"/>
-                </a:solidFill>
-              </a:rPr>
-              <a:t>organize files </a:t>
-            </a:r>
-            <a:r>
-              <a:rPr lang="en-GB" sz="2400" dirty="0">
-                <a:solidFill>
-                  <a:srgbClr val="0070C0"/>
-                </a:solidFill>
-              </a:rPr>
-              <a:t>chronologically</a:t>
-            </a:r>
+            <a:r>
+              <a:rPr lang="en-GB" sz="2800" dirty="0">
+                <a:solidFill>
+                  <a:srgbClr val="0070C0"/>
+                </a:solidFill>
+              </a:rPr>
+              <a:t>Exercise 1: </a:t>
+            </a:r>
+          </a:p>
+          <a:p>
+            <a:pPr algn="ctr"/>
             <a:endParaRPr lang="en-GB" sz="2800" dirty="0">
               <a:solidFill>
                 <a:srgbClr val="0070C0"/>
@@ -7901,140 +8295,24 @@
             </a:endParaRPr>
           </a:p>
           <a:p>
-            <a:pPr marL="457200" indent="-457200" algn="just">
-              <a:buFont typeface="Arial" panose="020B0604020202020204" pitchFamily="34" charset="0"/>
-              <a:buChar char="•"/>
-            </a:pPr>
-            <a:endParaRPr lang="pl-PL" sz="2800" dirty="0" smtClean="0">
-              <a:solidFill>
-                <a:srgbClr val="0070C0"/>
-              </a:solidFill>
-            </a:endParaRPr>
-          </a:p>
-          <a:p>
-            <a:pPr marL="457200" indent="-457200">
-              <a:buFont typeface="Arial" panose="020B0604020202020204" pitchFamily="34" charset="0"/>
-              <a:buChar char="•"/>
-            </a:pPr>
-            <a:r>
-              <a:rPr lang="en-GB" sz="2800" dirty="0" smtClean="0">
-                <a:solidFill>
-                  <a:srgbClr val="0070C0"/>
-                </a:solidFill>
-              </a:rPr>
-              <a:t>Include </a:t>
-            </a:r>
+            <a:pPr algn="ctr"/>
             <a:r>
               <a:rPr lang="en-GB" sz="2800" dirty="0">
                 <a:solidFill>
                   <a:srgbClr val="0070C0"/>
                 </a:solidFill>
               </a:rPr>
-              <a:t>version number (if applicable</a:t>
-            </a:r>
-            <a:r>
-              <a:rPr lang="en-GB" sz="2800" dirty="0" smtClean="0">
-                <a:solidFill>
-                  <a:srgbClr val="0070C0"/>
-                </a:solidFill>
-              </a:rPr>
-              <a:t>)</a:t>
-            </a:r>
-            <a:r>
-              <a:rPr lang="pl-PL" sz="2800" dirty="0" smtClean="0">
-                <a:solidFill>
-                  <a:srgbClr val="0070C0"/>
-                </a:solidFill>
-              </a:rPr>
-              <a:t> (ortogonal to date)</a:t>
-            </a:r>
-            <a:r>
-              <a:rPr lang="pl-PL" sz="2800" dirty="0">
-                <a:solidFill>
-                  <a:srgbClr val="0070C0"/>
-                </a:solidFill>
-              </a:rPr>
-              <a:t/>
-            </a:r>
-            <a:br>
-              <a:rPr lang="pl-PL" sz="2800" dirty="0">
-                <a:solidFill>
-                  <a:srgbClr val="0070C0"/>
-                </a:solidFill>
-              </a:rPr>
-            </a:br>
-            <a:r>
-              <a:rPr lang="pl-PL" sz="2800" dirty="0">
-                <a:solidFill>
-                  <a:srgbClr val="0070C0"/>
-                </a:solidFill>
-              </a:rPr>
-              <a:t/>
-            </a:r>
-            <a:br>
-              <a:rPr lang="pl-PL" sz="2800" dirty="0">
-                <a:solidFill>
-                  <a:srgbClr val="0070C0"/>
-                </a:solidFill>
-              </a:rPr>
-            </a:br>
-            <a:r>
-              <a:rPr lang="pl-PL" sz="2400" dirty="0" smtClean="0">
-                <a:solidFill>
-                  <a:srgbClr val="0070C0"/>
-                </a:solidFill>
-              </a:rPr>
-              <a:t>U</a:t>
-            </a:r>
-            <a:r>
-              <a:rPr lang="en-GB" sz="2400" dirty="0" smtClean="0">
-                <a:solidFill>
-                  <a:srgbClr val="0070C0"/>
-                </a:solidFill>
-              </a:rPr>
-              <a:t>se </a:t>
-            </a:r>
-            <a:r>
-              <a:rPr lang="en-GB" sz="2400" dirty="0">
-                <a:solidFill>
-                  <a:srgbClr val="0070C0"/>
-                </a:solidFill>
-              </a:rPr>
-              <a:t>leading zeroes (i.e.: v005 instead of v5</a:t>
-            </a:r>
-            <a:r>
-              <a:rPr lang="en-GB" sz="2400" dirty="0" smtClean="0">
-                <a:solidFill>
-                  <a:srgbClr val="0070C0"/>
-                </a:solidFill>
-              </a:rPr>
-              <a:t>)</a:t>
-            </a:r>
-            <a:endParaRPr lang="en-GB" sz="2400" dirty="0">
-              <a:solidFill>
-                <a:srgbClr val="0070C0"/>
-              </a:solidFill>
-            </a:endParaRPr>
-          </a:p>
-          <a:p>
-            <a:pPr marL="457200" indent="-457200" algn="just">
-              <a:buFont typeface="Arial" panose="020B0604020202020204" pitchFamily="34" charset="0"/>
-              <a:buChar char="•"/>
-            </a:pPr>
-            <a:endParaRPr lang="en-GB" sz="2800" dirty="0">
-              <a:solidFill>
-                <a:srgbClr val="0070C0"/>
-              </a:solidFill>
-            </a:endParaRPr>
+              <a:t>Naming and sorting </a:t>
+            </a:r>
           </a:p>
         </p:txBody>
       </p:sp>
       <p:pic>
         <p:nvPicPr>
-          <p:cNvPr id="6" name="Picture 2" descr="Ed_DaSH">
-            <a:extLst>
-              <a:ext uri="{FF2B5EF4-FFF2-40B4-BE49-F238E27FC236}">
-                <a16:creationId xmlns:a16="http://schemas.microsoft.com/office/drawing/2014/main" id="{6F3CF586-06D2-46C3-A4A3-130E31C4A16F}"/>
+          <p:cNvPr id="4" name="Picture 2" descr="Ed_DaSH">
+            <a:extLst>
+              <a:ext uri="{FF2B5EF4-FFF2-40B4-BE49-F238E27FC236}">
+                <a16:creationId xmlns:a16="http://schemas.microsoft.com/office/drawing/2014/main" id="{A783256F-E39E-4712-96B0-240BD611CFEB}"/>
               </a:ext>
             </a:extLst>
           </p:cNvPr>
@@ -8076,50 +8354,10 @@
           </a:extLst>
         </p:spPr>
       </p:pic>
-      <p:sp>
-        <p:nvSpPr>
-          <p:cNvPr id="4" name="TextBox 3">
-            <a:extLst>
-              <a:ext uri="{FF2B5EF4-FFF2-40B4-BE49-F238E27FC236}">
-                <a16:creationId xmlns:a16="http://schemas.microsoft.com/office/drawing/2014/main" id="{F4B0FDD5-5348-354F-A378-7241F2AF057B}"/>
-              </a:ext>
-            </a:extLst>
-          </p:cNvPr>
-          <p:cNvSpPr txBox="1"/>
-          <p:nvPr/>
-        </p:nvSpPr>
-        <p:spPr>
-          <a:xfrm>
-            <a:off x="2003831" y="444110"/>
-            <a:ext cx="3023585" cy="769441"/>
-          </a:xfrm>
-          <a:prstGeom prst="rect">
-            <a:avLst/>
-          </a:prstGeom>
-          <a:noFill/>
-        </p:spPr>
-        <p:txBody>
-          <a:bodyPr wrap="none" rtlCol="0">
-            <a:spAutoFit/>
-          </a:bodyPr>
-          <a:lstStyle/>
-          <a:p>
-            <a:pPr algn="ctr"/>
-            <a:r>
-              <a:rPr lang="en-GB" sz="4400" dirty="0">
-                <a:solidFill>
-                  <a:srgbClr val="0070C0"/>
-                </a:solidFill>
-              </a:rPr>
-              <a:t>Naming files</a:t>
-            </a:r>
-          </a:p>
-        </p:txBody>
-      </p:sp>
     </p:spTree>
     <p:extLst>
       <p:ext uri="{BB962C8B-B14F-4D97-AF65-F5344CB8AC3E}">
-        <p14:creationId xmlns:p14="http://schemas.microsoft.com/office/powerpoint/2010/main" val="1897341398"/>
+        <p14:creationId xmlns:p14="http://schemas.microsoft.com/office/powerpoint/2010/main" val="2280054951"/>
       </p:ext>
     </p:extLst>
   </p:cSld>
@@ -8161,7 +8399,7 @@
         <p:spPr>
           <a:xfrm>
             <a:off x="847780" y="1379400"/>
-            <a:ext cx="9751569" cy="5693866"/>
+            <a:ext cx="9751569" cy="5016758"/>
           </a:xfrm>
           <a:prstGeom prst="rect">
             <a:avLst/>
@@ -8199,6 +8437,133 @@
           </a:p>
           <a:p>
             <a:pPr algn="just"/>
+            <a:endParaRPr lang="en-GB" sz="2800" u="sng" dirty="0">
+              <a:solidFill>
+                <a:srgbClr val="0070C0"/>
+              </a:solidFill>
+            </a:endParaRPr>
+          </a:p>
+          <a:p>
+            <a:pPr marL="457200" indent="-457200">
+              <a:buFont typeface="Arial" panose="020B0604020202020204" pitchFamily="34" charset="0"/>
+              <a:buChar char="•"/>
+            </a:pPr>
+            <a:r>
+              <a:rPr lang="pl-PL" sz="2800" dirty="0" smtClean="0">
+                <a:solidFill>
+                  <a:srgbClr val="0070C0"/>
+                </a:solidFill>
+              </a:rPr>
+              <a:t>Include date in the name.</a:t>
+            </a:r>
+            <a:br>
+              <a:rPr lang="pl-PL" sz="2800" dirty="0" smtClean="0">
+                <a:solidFill>
+                  <a:srgbClr val="0070C0"/>
+                </a:solidFill>
+              </a:rPr>
+            </a:br>
+            <a:r>
+              <a:rPr lang="pl-PL" sz="2800" dirty="0" smtClean="0">
+                <a:solidFill>
+                  <a:srgbClr val="0070C0"/>
+                </a:solidFill>
+              </a:rPr>
+              <a:t/>
+            </a:r>
+            <a:br>
+              <a:rPr lang="pl-PL" sz="2800" dirty="0" smtClean="0">
+                <a:solidFill>
+                  <a:srgbClr val="0070C0"/>
+                </a:solidFill>
+              </a:rPr>
+            </a:br>
+            <a:r>
+              <a:rPr lang="en-GB" sz="2400" dirty="0" smtClean="0">
+                <a:solidFill>
+                  <a:srgbClr val="0070C0"/>
+                </a:solidFill>
+              </a:rPr>
+              <a:t>Use YYYY-MM-DD</a:t>
+            </a:r>
+            <a:r>
+              <a:rPr lang="pl-PL" sz="2400" dirty="0" smtClean="0">
+                <a:solidFill>
+                  <a:srgbClr val="0070C0"/>
+                </a:solidFill>
+              </a:rPr>
+              <a:t> or YYYMMDD format, eg. 20210920</a:t>
+            </a:r>
+            <a:r>
+              <a:rPr lang="pl-PL" sz="2400" dirty="0">
+                <a:solidFill>
+                  <a:srgbClr val="0070C0"/>
+                </a:solidFill>
+              </a:rPr>
+              <a:t/>
+            </a:r>
+            <a:br>
+              <a:rPr lang="pl-PL" sz="2400" dirty="0">
+                <a:solidFill>
+                  <a:srgbClr val="0070C0"/>
+                </a:solidFill>
+              </a:rPr>
+            </a:br>
+            <a:r>
+              <a:rPr lang="pl-PL" sz="2400" dirty="0" smtClean="0">
+                <a:solidFill>
+                  <a:srgbClr val="0070C0"/>
+                </a:solidFill>
+              </a:rPr>
+              <a:t/>
+            </a:r>
+            <a:br>
+              <a:rPr lang="pl-PL" sz="2400" dirty="0" smtClean="0">
+                <a:solidFill>
+                  <a:srgbClr val="0070C0"/>
+                </a:solidFill>
+              </a:rPr>
+            </a:br>
+            <a:r>
+              <a:rPr lang="pl-PL" sz="2400" dirty="0" smtClean="0">
+                <a:solidFill>
+                  <a:srgbClr val="0070C0"/>
+                </a:solidFill>
+              </a:rPr>
+              <a:t>Add date at</a:t>
+            </a:r>
+            <a:r>
+              <a:rPr lang="en-GB" sz="2400" dirty="0" smtClean="0">
+                <a:solidFill>
+                  <a:srgbClr val="0070C0"/>
+                </a:solidFill>
+              </a:rPr>
+              <a:t> </a:t>
+            </a:r>
+            <a:r>
+              <a:rPr lang="en-GB" sz="2400" dirty="0">
+                <a:solidFill>
+                  <a:srgbClr val="0070C0"/>
+                </a:solidFill>
+              </a:rPr>
+              <a:t>the end of the file UNLESS you </a:t>
+            </a:r>
+            <a:r>
+              <a:rPr lang="en-GB" sz="2400" dirty="0" smtClean="0">
+                <a:solidFill>
+                  <a:srgbClr val="0070C0"/>
+                </a:solidFill>
+              </a:rPr>
+              <a:t>organize files </a:t>
+            </a:r>
+            <a:r>
+              <a:rPr lang="en-GB" sz="2400" dirty="0">
+                <a:solidFill>
+                  <a:srgbClr val="0070C0"/>
+                </a:solidFill>
+              </a:rPr>
+              <a:t>chronologically</a:t>
+            </a:r>
             <a:endParaRPr lang="en-GB" sz="2800" dirty="0">
               <a:solidFill>
                 <a:srgbClr val="0070C0"/>
@@ -8206,17 +8571,52 @@
             </a:endParaRPr>
           </a:p>
           <a:p>
+            <a:pPr marL="457200" indent="-457200" algn="just">
+              <a:buFont typeface="Arial" panose="020B0604020202020204" pitchFamily="34" charset="0"/>
+              <a:buChar char="•"/>
+            </a:pPr>
+            <a:endParaRPr lang="pl-PL" sz="2800" dirty="0" smtClean="0">
+              <a:solidFill>
+                <a:srgbClr val="0070C0"/>
+              </a:solidFill>
+            </a:endParaRPr>
+          </a:p>
+          <a:p>
             <a:pPr marL="457200" indent="-457200">
               <a:buFont typeface="Arial" panose="020B0604020202020204" pitchFamily="34" charset="0"/>
               <a:buChar char="•"/>
             </a:pPr>
             <a:r>
+              <a:rPr lang="en-GB" sz="2800" dirty="0" smtClean="0">
+                <a:solidFill>
+                  <a:srgbClr val="0070C0"/>
+                </a:solidFill>
+              </a:rPr>
+              <a:t>Include </a:t>
+            </a:r>
+            <a:r>
+              <a:rPr lang="en-GB" sz="2800" dirty="0">
+                <a:solidFill>
+                  <a:srgbClr val="0070C0"/>
+                </a:solidFill>
+              </a:rPr>
+              <a:t>version number (if applicable</a:t>
+            </a:r>
+            <a:r>
+              <a:rPr lang="en-GB" sz="2800" dirty="0" smtClean="0">
+                <a:solidFill>
+                  <a:srgbClr val="0070C0"/>
+                </a:solidFill>
+              </a:rPr>
+              <a:t>)</a:t>
+            </a:r>
+            <a:r>
               <a:rPr lang="pl-PL" sz="2800" dirty="0" smtClean="0">
                 <a:solidFill>
                   <a:srgbClr val="0070C0"/>
                 </a:solidFill>
               </a:rPr>
-              <a:t>Encode shortly biological or experimental relevant information,</a:t>
+              <a:t> (ortogonal to date)</a:t>
             </a:r>
             <a:r>
               <a:rPr lang="pl-PL" sz="2800" dirty="0">
@@ -8224,138 +8624,74 @@
                   <a:srgbClr val="0070C0"/>
                 </a:solidFill>
               </a:rPr>
-              <a:t> </a:t>
-            </a:r>
-            <a:r>
-              <a:rPr lang="pl-PL" sz="2800" dirty="0" smtClean="0">
-                <a:solidFill>
-                  <a:srgbClr val="0070C0"/>
-                </a:solidFill>
-              </a:rPr>
-              <a:t>data catagory, etc. </a:t>
+              <a:t/>
             </a:r>
             <a:br>
-              <a:rPr lang="pl-PL" sz="2800" dirty="0" smtClean="0">
+              <a:rPr lang="pl-PL" sz="2800" dirty="0">
                 <a:solidFill>
                   <a:srgbClr val="0070C0"/>
                 </a:solidFill>
               </a:rPr>
             </a:br>
             <a:r>
-              <a:rPr lang="pl-PL" sz="2800" dirty="0" smtClean="0">
-                <a:solidFill>
-                  <a:srgbClr val="0070C0"/>
-                </a:solidFill>
-              </a:rPr>
-              <a:t>Example information to include:</a:t>
-            </a:r>
-          </a:p>
-          <a:p>
-            <a:pPr marL="914400" lvl="1" indent="-457200">
+              <a:rPr lang="pl-PL" sz="2800" dirty="0">
+                <a:solidFill>
+                  <a:srgbClr val="0070C0"/>
+                </a:solidFill>
+              </a:rPr>
+              <a:t/>
+            </a:r>
+            <a:br>
+              <a:rPr lang="pl-PL" sz="2800" dirty="0">
+                <a:solidFill>
+                  <a:srgbClr val="0070C0"/>
+                </a:solidFill>
+              </a:rPr>
+            </a:br>
+            <a:r>
+              <a:rPr lang="pl-PL" sz="2400" dirty="0" smtClean="0">
+                <a:solidFill>
+                  <a:srgbClr val="0070C0"/>
+                </a:solidFill>
+              </a:rPr>
+              <a:t>U</a:t>
+            </a:r>
+            <a:r>
+              <a:rPr lang="en-GB" sz="2400" dirty="0" smtClean="0">
+                <a:solidFill>
+                  <a:srgbClr val="0070C0"/>
+                </a:solidFill>
+              </a:rPr>
+              <a:t>se </a:t>
+            </a:r>
+            <a:r>
+              <a:rPr lang="en-GB" sz="2400" dirty="0">
+                <a:solidFill>
+                  <a:srgbClr val="0070C0"/>
+                </a:solidFill>
+              </a:rPr>
+              <a:t>leading zeroes (i.e.: v005 instead of v5</a:t>
+            </a:r>
+            <a:r>
+              <a:rPr lang="en-GB" sz="2400" dirty="0" smtClean="0">
+                <a:solidFill>
+                  <a:srgbClr val="0070C0"/>
+                </a:solidFill>
+              </a:rPr>
+              <a:t>)</a:t>
+            </a:r>
+            <a:endParaRPr lang="en-GB" sz="2400" dirty="0">
+              <a:solidFill>
+                <a:srgbClr val="0070C0"/>
+              </a:solidFill>
+            </a:endParaRPr>
+          </a:p>
+          <a:p>
+            <a:pPr marL="457200" indent="-457200" algn="just">
               <a:buFont typeface="Arial" panose="020B0604020202020204" pitchFamily="34" charset="0"/>
               <a:buChar char="•"/>
             </a:pPr>
-            <a:r>
-              <a:rPr lang="pl-PL" sz="2800" dirty="0" smtClean="0">
-                <a:solidFill>
-                  <a:srgbClr val="0070C0"/>
-                </a:solidFill>
-              </a:rPr>
-              <a:t>sample, site, patient id</a:t>
-            </a:r>
-          </a:p>
-          <a:p>
-            <a:pPr marL="914400" lvl="1" indent="-457200">
-              <a:buFont typeface="Arial" panose="020B0604020202020204" pitchFamily="34" charset="0"/>
-              <a:buChar char="•"/>
-            </a:pPr>
-            <a:r>
-              <a:rPr lang="pl-PL" sz="2800" dirty="0" smtClean="0">
-                <a:solidFill>
-                  <a:srgbClr val="0070C0"/>
-                </a:solidFill>
-              </a:rPr>
-              <a:t>drug treatments, doses, names</a:t>
-            </a:r>
-          </a:p>
-          <a:p>
-            <a:pPr marL="914400" lvl="1" indent="-457200">
-              <a:buFont typeface="Arial" panose="020B0604020202020204" pitchFamily="34" charset="0"/>
-              <a:buChar char="•"/>
-            </a:pPr>
-            <a:r>
-              <a:rPr lang="pl-PL" sz="2800" dirty="0" smtClean="0">
-                <a:solidFill>
-                  <a:srgbClr val="0070C0"/>
-                </a:solidFill>
-              </a:rPr>
-              <a:t>environmntal conditions</a:t>
-            </a:r>
-          </a:p>
-          <a:p>
-            <a:pPr marL="914400" lvl="1" indent="-457200">
-              <a:buFont typeface="Arial" panose="020B0604020202020204" pitchFamily="34" charset="0"/>
-              <a:buChar char="•"/>
-            </a:pPr>
-            <a:r>
-              <a:rPr lang="pl-PL" sz="2800" dirty="0" smtClean="0">
-                <a:solidFill>
-                  <a:srgbClr val="0070C0"/>
-                </a:solidFill>
-              </a:rPr>
-              <a:t>genotypes, markers, </a:t>
-            </a:r>
-          </a:p>
-          <a:p>
-            <a:pPr marL="914400" lvl="1" indent="-457200">
-              <a:buFont typeface="Arial" panose="020B0604020202020204" pitchFamily="34" charset="0"/>
-              <a:buChar char="•"/>
-            </a:pPr>
-            <a:r>
-              <a:rPr lang="pl-PL" sz="2800" dirty="0" smtClean="0">
-                <a:solidFill>
-                  <a:srgbClr val="0070C0"/>
-                </a:solidFill>
-              </a:rPr>
-              <a:t>technique</a:t>
-            </a:r>
-          </a:p>
-          <a:p>
-            <a:pPr marL="914400" lvl="1" indent="-457200">
-              <a:buFont typeface="Arial" panose="020B0604020202020204" pitchFamily="34" charset="0"/>
-              <a:buChar char="•"/>
-            </a:pPr>
-            <a:r>
-              <a:rPr lang="pl-PL" sz="2800" dirty="0" smtClean="0">
-                <a:solidFill>
-                  <a:srgbClr val="0070C0"/>
-                </a:solidFill>
-              </a:rPr>
-              <a:t>Data operation: normalized, cleaned, detrended, clustered</a:t>
-            </a:r>
-            <a:br>
-              <a:rPr lang="pl-PL" sz="2800" dirty="0" smtClean="0">
-                <a:solidFill>
-                  <a:srgbClr val="0070C0"/>
-                </a:solidFill>
-              </a:rPr>
-            </a:br>
-            <a:r>
-              <a:rPr lang="pl-PL" sz="2800" dirty="0" smtClean="0">
-                <a:solidFill>
-                  <a:srgbClr val="0070C0"/>
-                </a:solidFill>
-              </a:rPr>
-              <a:t/>
-            </a:r>
-            <a:br>
-              <a:rPr lang="pl-PL" sz="2800" dirty="0" smtClean="0">
-                <a:solidFill>
-                  <a:srgbClr val="0070C0"/>
-                </a:solidFill>
-              </a:rPr>
-            </a:br>
-            <a:endParaRPr lang="pl-PL" sz="2800" dirty="0" smtClean="0">
+            <a:endParaRPr lang="en-GB" sz="2800" dirty="0">
               <a:solidFill>
                 <a:srgbClr val="0070C0"/>
               </a:solidFill>
@@ -8453,7 +8789,7 @@
     </p:spTree>
     <p:extLst>
       <p:ext uri="{BB962C8B-B14F-4D97-AF65-F5344CB8AC3E}">
-        <p14:creationId xmlns:p14="http://schemas.microsoft.com/office/powerpoint/2010/main" val="2035704270"/>
+        <p14:creationId xmlns:p14="http://schemas.microsoft.com/office/powerpoint/2010/main" val="1897341398"/>
       </p:ext>
     </p:extLst>
   </p:cSld>
@@ -8495,7 +8831,7 @@
         <p:spPr>
           <a:xfrm>
             <a:off x="847780" y="1379400"/>
-            <a:ext cx="9751569" cy="2677656"/>
+            <a:ext cx="9751569" cy="5693866"/>
           </a:xfrm>
           <a:prstGeom prst="rect">
             <a:avLst/>
@@ -8533,7 +8869,7 @@
           </a:p>
           <a:p>
             <a:pPr algn="just"/>
-            <a:endParaRPr lang="en-GB" sz="2800" u="sng" dirty="0">
+            <a:endParaRPr lang="en-GB" sz="2800" dirty="0">
               <a:solidFill>
                 <a:srgbClr val="0070C0"/>
               </a:solidFill>
@@ -8550,22 +8886,56 @@
                   <a:srgbClr val="0070C0"/>
                 </a:solidFill>
               </a:rPr>
-              <a:t>Add leading zeros to numerical values</a:t>
-            </a:r>
-          </a:p>
-          <a:p>
-            <a:pPr marL="457200" indent="-457200">
+              <a:t>Encode shortly biological or experimental relevant information,</a:t>
+            </a:r>
+            <a:r>
+              <a:rPr lang="pl-PL" sz="2800" dirty="0">
+                <a:solidFill>
+                  <a:srgbClr val="0070C0"/>
+                </a:solidFill>
+              </a:rPr>
+              <a:t> </a:t>
+            </a:r>
+            <a:r>
+              <a:rPr lang="pl-PL" sz="2800" dirty="0" smtClean="0">
+                <a:solidFill>
+                  <a:srgbClr val="0070C0"/>
+                </a:solidFill>
+              </a:rPr>
+              <a:t>data catagory, etc. </a:t>
+            </a:r>
+            <a:br>
+              <a:rPr lang="pl-PL" sz="2800" dirty="0" smtClean="0">
+                <a:solidFill>
+                  <a:srgbClr val="0070C0"/>
+                </a:solidFill>
+              </a:rPr>
+            </a:br>
+            <a:r>
+              <a:rPr lang="pl-PL" sz="2800" dirty="0" smtClean="0">
+                <a:solidFill>
+                  <a:srgbClr val="0070C0"/>
+                </a:solidFill>
+              </a:rPr>
+              <a:t>Example information to include:</a:t>
+            </a:r>
+          </a:p>
+          <a:p>
+            <a:pPr marL="914400" lvl="1" indent="-457200">
               <a:buFont typeface="Arial" panose="020B0604020202020204" pitchFamily="34" charset="0"/>
               <a:buChar char="•"/>
             </a:pPr>
-            <a:endParaRPr lang="pl-PL" sz="2800" dirty="0" smtClean="0">
-              <a:solidFill>
-                <a:srgbClr val="0070C0"/>
-              </a:solidFill>
-            </a:endParaRPr>
-          </a:p>
-          <a:p>
-            <a:pPr marL="457200" indent="-457200">
+            <a:r>
+              <a:rPr lang="pl-PL" sz="2800" dirty="0" smtClean="0">
+                <a:solidFill>
+                  <a:srgbClr val="0070C0"/>
+                </a:solidFill>
+              </a:rPr>
+              <a:t>sample, site, patient id</a:t>
+            </a:r>
+          </a:p>
+          <a:p>
+            <a:pPr marL="914400" lvl="1" indent="-457200">
               <a:buFont typeface="Arial" panose="020B0604020202020204" pitchFamily="34" charset="0"/>
               <a:buChar char="•"/>
             </a:pPr>
@@ -8575,15 +8945,87 @@
                   <a:srgbClr val="0070C0"/>
                 </a:solidFill>
               </a:rPr>
-              <a:t>Add prefixes to numerical values: eg. S003, TR005</a:t>
-            </a:r>
-          </a:p>
-          <a:p>
-            <a:pPr marL="457200" indent="-457200">
+              <a:t>drug treatments, doses, names</a:t>
+            </a:r>
+          </a:p>
+          <a:p>
+            <a:pPr marL="914400" lvl="1" indent="-457200">
               <a:buFont typeface="Arial" panose="020B0604020202020204" pitchFamily="34" charset="0"/>
               <a:buChar char="•"/>
             </a:pPr>
-            <a:endParaRPr lang="en-GB" sz="2800" dirty="0">
+            <a:r>
+              <a:rPr lang="pl-PL" sz="2800" dirty="0" smtClean="0">
+                <a:solidFill>
+                  <a:srgbClr val="0070C0"/>
+                </a:solidFill>
+              </a:rPr>
+              <a:t>environmntal conditions</a:t>
+            </a:r>
+          </a:p>
+          <a:p>
+            <a:pPr marL="914400" lvl="1" indent="-457200">
+              <a:buFont typeface="Arial" panose="020B0604020202020204" pitchFamily="34" charset="0"/>
+              <a:buChar char="•"/>
+            </a:pPr>
+            <a:r>
+              <a:rPr lang="pl-PL" sz="2800" dirty="0" smtClean="0">
+                <a:solidFill>
+                  <a:srgbClr val="0070C0"/>
+                </a:solidFill>
+              </a:rPr>
+              <a:t>genotypes, markers, </a:t>
+            </a:r>
+          </a:p>
+          <a:p>
+            <a:pPr marL="914400" lvl="1" indent="-457200">
+              <a:buFont typeface="Arial" panose="020B0604020202020204" pitchFamily="34" charset="0"/>
+              <a:buChar char="•"/>
+            </a:pPr>
+            <a:r>
+              <a:rPr lang="pl-PL" sz="2800" dirty="0" smtClean="0">
+                <a:solidFill>
+                  <a:srgbClr val="0070C0"/>
+                </a:solidFill>
+              </a:rPr>
+              <a:t>technique</a:t>
+            </a:r>
+          </a:p>
+          <a:p>
+            <a:pPr marL="914400" lvl="1" indent="-457200">
+              <a:buFont typeface="Arial" panose="020B0604020202020204" pitchFamily="34" charset="0"/>
+              <a:buChar char="•"/>
+            </a:pPr>
+            <a:r>
+              <a:rPr lang="pl-PL" sz="2800" dirty="0" smtClean="0">
+                <a:solidFill>
+                  <a:srgbClr val="0070C0"/>
+                </a:solidFill>
+              </a:rPr>
+              <a:t>Data operation: normalized, cleaned, detrended, clustered</a:t>
+            </a:r>
+            <a:br>
+              <a:rPr lang="pl-PL" sz="2800" dirty="0" smtClean="0">
+                <a:solidFill>
+                  <a:srgbClr val="0070C0"/>
+                </a:solidFill>
+              </a:rPr>
+            </a:br>
+            <a:r>
+              <a:rPr lang="pl-PL" sz="2800" dirty="0" smtClean="0">
+                <a:solidFill>
+                  <a:srgbClr val="0070C0"/>
+                </a:solidFill>
+              </a:rPr>
+              <a:t/>
+            </a:r>
+            <a:br>
+              <a:rPr lang="pl-PL" sz="2800" dirty="0" smtClean="0">
+                <a:solidFill>
+                  <a:srgbClr val="0070C0"/>
+                </a:solidFill>
+              </a:rPr>
+            </a:br>
+            <a:endParaRPr lang="pl-PL" sz="2800" dirty="0" smtClean="0">
               <a:solidFill>
                 <a:srgbClr val="0070C0"/>
               </a:solidFill>
@@ -8681,7 +9123,7 @@
     </p:spTree>
     <p:extLst>
       <p:ext uri="{BB962C8B-B14F-4D97-AF65-F5344CB8AC3E}">
-        <p14:creationId xmlns:p14="http://schemas.microsoft.com/office/powerpoint/2010/main" val="1052159509"/>
+        <p14:creationId xmlns:p14="http://schemas.microsoft.com/office/powerpoint/2010/main" val="2035704270"/>
       </p:ext>
     </p:extLst>
   </p:cSld>
@@ -8723,7 +9165,7 @@
         <p:spPr>
           <a:xfrm>
             <a:off x="847780" y="1379400"/>
-            <a:ext cx="9751569" cy="3539430"/>
+            <a:ext cx="9751569" cy="2677656"/>
           </a:xfrm>
           <a:prstGeom prst="rect">
             <a:avLst/>
@@ -8773,90 +9215,38 @@
               <a:buChar char="•"/>
             </a:pPr>
             <a:r>
-              <a:rPr lang="en-GB" sz="2800" dirty="0" smtClean="0">
-                <a:solidFill>
-                  <a:srgbClr val="0070C0"/>
-                </a:solidFill>
-              </a:rPr>
-              <a:t>Make </a:t>
-            </a:r>
-            <a:r>
-              <a:rPr lang="en-GB" sz="2800" dirty="0">
-                <a:solidFill>
-                  <a:srgbClr val="0070C0"/>
-                </a:solidFill>
-              </a:rPr>
-              <a:t>sure the </a:t>
-            </a:r>
-            <a:r>
-              <a:rPr lang="en-GB" sz="2800" dirty="0" smtClean="0">
-                <a:solidFill>
-                  <a:srgbClr val="0070C0"/>
-                </a:solidFill>
-              </a:rPr>
-              <a:t>file </a:t>
-            </a:r>
-            <a:r>
-              <a:rPr lang="en-GB" sz="2800" dirty="0">
-                <a:solidFill>
-                  <a:srgbClr val="0070C0"/>
-                </a:solidFill>
-              </a:rPr>
-              <a:t>format extension is present at the end of the name (e.g. .doc, .</a:t>
-            </a:r>
-            <a:r>
-              <a:rPr lang="en-GB" sz="2800" dirty="0" err="1" smtClean="0">
-                <a:solidFill>
-                  <a:srgbClr val="0070C0"/>
-                </a:solidFill>
-              </a:rPr>
-              <a:t>xls</a:t>
-            </a:r>
-            <a:r>
               <a:rPr lang="pl-PL" sz="2800" dirty="0" smtClean="0">
                 <a:solidFill>
                   <a:srgbClr val="0070C0"/>
                 </a:solidFill>
               </a:rPr>
-              <a:t>x</a:t>
-            </a:r>
-            <a:r>
-              <a:rPr lang="en-GB" sz="2800" dirty="0" smtClean="0">
-                <a:solidFill>
-                  <a:srgbClr val="0070C0"/>
-                </a:solidFill>
-              </a:rPr>
-              <a:t>, </a:t>
-            </a:r>
-            <a:r>
-              <a:rPr lang="en-GB" sz="2800" dirty="0">
-                <a:solidFill>
-                  <a:srgbClr val="0070C0"/>
-                </a:solidFill>
-              </a:rPr>
-              <a:t>.mov, .</a:t>
-            </a:r>
-            <a:r>
-              <a:rPr lang="en-GB" sz="2800" dirty="0" err="1">
-                <a:solidFill>
-                  <a:srgbClr val="0070C0"/>
-                </a:solidFill>
-              </a:rPr>
-              <a:t>tif</a:t>
-            </a:r>
-            <a:r>
-              <a:rPr lang="en-GB" sz="2800" dirty="0" smtClean="0">
-                <a:solidFill>
-                  <a:srgbClr val="0070C0"/>
-                </a:solidFill>
-              </a:rPr>
-              <a:t>)</a:t>
-            </a:r>
+              <a:t>Add leading zeros to numerical values</a:t>
+            </a:r>
+          </a:p>
+          <a:p>
+            <a:pPr marL="457200" indent="-457200">
+              <a:buFont typeface="Arial" panose="020B0604020202020204" pitchFamily="34" charset="0"/>
+              <a:buChar char="•"/>
+            </a:pPr>
             <a:endParaRPr lang="pl-PL" sz="2800" dirty="0" smtClean="0">
               <a:solidFill>
                 <a:srgbClr val="0070C0"/>
               </a:solidFill>
             </a:endParaRPr>
+          </a:p>
+          <a:p>
+            <a:pPr marL="457200" indent="-457200">
+              <a:buFont typeface="Arial" panose="020B0604020202020204" pitchFamily="34" charset="0"/>
+              <a:buChar char="•"/>
+            </a:pPr>
+            <a:r>
+              <a:rPr lang="pl-PL" sz="2800" dirty="0" smtClean="0">
+                <a:solidFill>
+                  <a:srgbClr val="0070C0"/>
+                </a:solidFill>
+              </a:rPr>
+              <a:t>Add prefixes to numerical values: eg. S003, TR005</a:t>
+            </a:r>
           </a:p>
           <a:p>
             <a:pPr marL="457200" indent="-457200">
@@ -8868,20 +9258,6 @@
                 <a:srgbClr val="0070C0"/>
               </a:solidFill>
             </a:endParaRPr>
-          </a:p>
-          <a:p>
-            <a:pPr marL="457200" indent="-457200">
-              <a:buFont typeface="Arial" panose="020B0604020202020204" pitchFamily="34" charset="0"/>
-              <a:buChar char="•"/>
-            </a:pPr>
-            <a:r>
-              <a:rPr lang="en-GB" sz="2800" dirty="0">
-                <a:solidFill>
-                  <a:srgbClr val="0070C0"/>
-                </a:solidFill>
-              </a:rPr>
-              <a:t>Add a PROJECT_STRUCTURE (README) file in your top directory which details your naming convention, directory structure and abbreviations</a:t>
-            </a:r>
           </a:p>
         </p:txBody>
       </p:sp>
@@ -8975,7 +9351,7 @@
     </p:spTree>
     <p:extLst>
       <p:ext uri="{BB962C8B-B14F-4D97-AF65-F5344CB8AC3E}">
-        <p14:creationId xmlns:p14="http://schemas.microsoft.com/office/powerpoint/2010/main" val="3899321088"/>
+        <p14:creationId xmlns:p14="http://schemas.microsoft.com/office/powerpoint/2010/main" val="1052159509"/>
       </p:ext>
     </p:extLst>
   </p:cSld>

</xml_diff>